<commit_message>
04/07: présentation finalisée et mergée pour demain
</commit_message>
<xml_diff>
--- a/Travail_realise/Presentations/PresentationSAIAD_5Juillet.pptx
+++ b/Travail_realise/Presentations/PresentationSAIAD_5Juillet.pptx
@@ -5,7 +5,7 @@
     <p:sldMasterId id="2147483660" r:id="rId1"/>
   </p:sldMasterIdLst>
   <p:notesMasterIdLst>
-    <p:notesMasterId r:id="rId21"/>
+    <p:notesMasterId r:id="rId22"/>
   </p:notesMasterIdLst>
   <p:sldIdLst>
     <p:sldId id="256" r:id="rId2"/>
@@ -26,7 +26,8 @@
     <p:sldId id="274" r:id="rId17"/>
     <p:sldId id="273" r:id="rId18"/>
     <p:sldId id="275" r:id="rId19"/>
-    <p:sldId id="272" r:id="rId20"/>
+    <p:sldId id="276" r:id="rId20"/>
+    <p:sldId id="272" r:id="rId21"/>
   </p:sldIdLst>
   <p:sldSz cx="12192000" cy="6858000"/>
   <p:notesSz cx="6858000" cy="9144000"/>
@@ -215,7 +216,7 @@
           <a:p>
             <a:fld id="{9A19760B-F482-4A28-9985-DAC59822EDF9}" type="datetimeFigureOut">
               <a:rPr lang="fr-FR" smtClean="0"/>
-              <a:t>03/07/2017</a:t>
+              <a:t>04/07/2017</a:t>
             </a:fld>
             <a:endParaRPr lang="fr-FR"/>
           </a:p>
@@ -567,6 +568,376 @@
 </p:notes>
 </file>
 
+<file path=ppt/notesSlides/notesSlide10.xml><?xml version="1.0" encoding="utf-8"?>
+<p:notes xmlns:a="http://schemas.openxmlformats.org/drawingml/2006/main" xmlns:r="http://schemas.openxmlformats.org/officeDocument/2006/relationships" xmlns:p="http://schemas.openxmlformats.org/presentationml/2006/main">
+  <p:cSld>
+    <p:spTree>
+      <p:nvGrpSpPr>
+        <p:cNvPr id="1" name=""/>
+        <p:cNvGrpSpPr/>
+        <p:nvPr/>
+      </p:nvGrpSpPr>
+      <p:grpSpPr>
+        <a:xfrm>
+          <a:off x="0" y="0"/>
+          <a:ext cx="0" cy="0"/>
+          <a:chOff x="0" y="0"/>
+          <a:chExt cx="0" cy="0"/>
+        </a:xfrm>
+      </p:grpSpPr>
+      <p:sp>
+        <p:nvSpPr>
+          <p:cNvPr id="2" name="Espace réservé de l'image des diapositives 1"/>
+          <p:cNvSpPr>
+            <a:spLocks noGrp="1" noRot="1" noChangeAspect="1"/>
+          </p:cNvSpPr>
+          <p:nvPr>
+            <p:ph type="sldImg"/>
+          </p:nvPr>
+        </p:nvSpPr>
+        <p:spPr/>
+      </p:sp>
+      <p:sp>
+        <p:nvSpPr>
+          <p:cNvPr id="3" name="Espace réservé des commentaires 2"/>
+          <p:cNvSpPr>
+            <a:spLocks noGrp="1"/>
+          </p:cNvSpPr>
+          <p:nvPr>
+            <p:ph type="body" idx="1"/>
+          </p:nvPr>
+        </p:nvSpPr>
+        <p:spPr/>
+        <p:txBody>
+          <a:bodyPr/>
+          <a:lstStyle/>
+          <a:p>
+            <a:endParaRPr lang="fr-FR" dirty="0"/>
+          </a:p>
+        </p:txBody>
+      </p:sp>
+      <p:sp>
+        <p:nvSpPr>
+          <p:cNvPr id="4" name="Espace réservé du numéro de diapositive 3"/>
+          <p:cNvSpPr>
+            <a:spLocks noGrp="1"/>
+          </p:cNvSpPr>
+          <p:nvPr>
+            <p:ph type="sldNum" sz="quarter" idx="10"/>
+          </p:nvPr>
+        </p:nvSpPr>
+        <p:spPr/>
+        <p:txBody>
+          <a:bodyPr/>
+          <a:lstStyle/>
+          <a:p>
+            <a:fld id="{187221B9-9FE5-432F-A9DE-276993DF5943}" type="slidenum">
+              <a:rPr lang="fr-FR" smtClean="0"/>
+              <a:t>15</a:t>
+            </a:fld>
+            <a:endParaRPr lang="fr-FR"/>
+          </a:p>
+        </p:txBody>
+      </p:sp>
+    </p:spTree>
+    <p:extLst>
+      <p:ext uri="{BB962C8B-B14F-4D97-AF65-F5344CB8AC3E}">
+        <p14:creationId xmlns:p14="http://schemas.microsoft.com/office/powerpoint/2010/main" val="3397968410"/>
+      </p:ext>
+    </p:extLst>
+  </p:cSld>
+  <p:clrMapOvr>
+    <a:masterClrMapping/>
+  </p:clrMapOvr>
+</p:notes>
+</file>
+
+<file path=ppt/notesSlides/notesSlide11.xml><?xml version="1.0" encoding="utf-8"?>
+<p:notes xmlns:a="http://schemas.openxmlformats.org/drawingml/2006/main" xmlns:r="http://schemas.openxmlformats.org/officeDocument/2006/relationships" xmlns:p="http://schemas.openxmlformats.org/presentationml/2006/main">
+  <p:cSld>
+    <p:spTree>
+      <p:nvGrpSpPr>
+        <p:cNvPr id="1" name=""/>
+        <p:cNvGrpSpPr/>
+        <p:nvPr/>
+      </p:nvGrpSpPr>
+      <p:grpSpPr>
+        <a:xfrm>
+          <a:off x="0" y="0"/>
+          <a:ext cx="0" cy="0"/>
+          <a:chOff x="0" y="0"/>
+          <a:chExt cx="0" cy="0"/>
+        </a:xfrm>
+      </p:grpSpPr>
+      <p:sp>
+        <p:nvSpPr>
+          <p:cNvPr id="2" name="Espace réservé de l'image des diapositives 1"/>
+          <p:cNvSpPr>
+            <a:spLocks noGrp="1" noRot="1" noChangeAspect="1"/>
+          </p:cNvSpPr>
+          <p:nvPr>
+            <p:ph type="sldImg"/>
+          </p:nvPr>
+        </p:nvSpPr>
+        <p:spPr/>
+      </p:sp>
+      <p:sp>
+        <p:nvSpPr>
+          <p:cNvPr id="3" name="Espace réservé des commentaires 2"/>
+          <p:cNvSpPr>
+            <a:spLocks noGrp="1"/>
+          </p:cNvSpPr>
+          <p:nvPr>
+            <p:ph type="body" idx="1"/>
+          </p:nvPr>
+        </p:nvSpPr>
+        <p:spPr/>
+        <p:txBody>
+          <a:bodyPr/>
+          <a:lstStyle/>
+          <a:p>
+            <a:r>
+              <a:rPr lang="fr-FR" baseline="0" dirty="0" smtClean="0"/>
+              <a:t>Sans suppression des muscles la tumeur se propagerait sur les muscles</a:t>
+            </a:r>
+          </a:p>
+          <a:p>
+            <a:r>
+              <a:rPr lang="fr-FR" baseline="0" dirty="0" smtClean="0"/>
+              <a:t>Des post traitements sont à envisager </a:t>
+            </a:r>
+            <a:r>
+              <a:rPr lang="fr-FR" baseline="0" smtClean="0"/>
+              <a:t>bien entendu</a:t>
+            </a:r>
+            <a:endParaRPr lang="fr-FR" baseline="0" dirty="0" smtClean="0"/>
+          </a:p>
+        </p:txBody>
+      </p:sp>
+      <p:sp>
+        <p:nvSpPr>
+          <p:cNvPr id="4" name="Espace réservé du numéro de diapositive 3"/>
+          <p:cNvSpPr>
+            <a:spLocks noGrp="1"/>
+          </p:cNvSpPr>
+          <p:nvPr>
+            <p:ph type="sldNum" sz="quarter" idx="10"/>
+          </p:nvPr>
+        </p:nvSpPr>
+        <p:spPr/>
+        <p:txBody>
+          <a:bodyPr/>
+          <a:lstStyle/>
+          <a:p>
+            <a:fld id="{187221B9-9FE5-432F-A9DE-276993DF5943}" type="slidenum">
+              <a:rPr lang="fr-FR" smtClean="0"/>
+              <a:t>16</a:t>
+            </a:fld>
+            <a:endParaRPr lang="fr-FR"/>
+          </a:p>
+        </p:txBody>
+      </p:sp>
+    </p:spTree>
+    <p:extLst>
+      <p:ext uri="{BB962C8B-B14F-4D97-AF65-F5344CB8AC3E}">
+        <p14:creationId xmlns:p14="http://schemas.microsoft.com/office/powerpoint/2010/main" val="3413638133"/>
+      </p:ext>
+    </p:extLst>
+  </p:cSld>
+  <p:clrMapOvr>
+    <a:masterClrMapping/>
+  </p:clrMapOvr>
+</p:notes>
+</file>
+
+<file path=ppt/notesSlides/notesSlide12.xml><?xml version="1.0" encoding="utf-8"?>
+<p:notes xmlns:a="http://schemas.openxmlformats.org/drawingml/2006/main" xmlns:r="http://schemas.openxmlformats.org/officeDocument/2006/relationships" xmlns:p="http://schemas.openxmlformats.org/presentationml/2006/main">
+  <p:cSld>
+    <p:spTree>
+      <p:nvGrpSpPr>
+        <p:cNvPr id="1" name=""/>
+        <p:cNvGrpSpPr/>
+        <p:nvPr/>
+      </p:nvGrpSpPr>
+      <p:grpSpPr>
+        <a:xfrm>
+          <a:off x="0" y="0"/>
+          <a:ext cx="0" cy="0"/>
+          <a:chOff x="0" y="0"/>
+          <a:chExt cx="0" cy="0"/>
+        </a:xfrm>
+      </p:grpSpPr>
+      <p:sp>
+        <p:nvSpPr>
+          <p:cNvPr id="2" name="Espace réservé de l'image des diapositives 1"/>
+          <p:cNvSpPr>
+            <a:spLocks noGrp="1" noRot="1" noChangeAspect="1"/>
+          </p:cNvSpPr>
+          <p:nvPr>
+            <p:ph type="sldImg"/>
+          </p:nvPr>
+        </p:nvSpPr>
+        <p:spPr/>
+      </p:sp>
+      <p:sp>
+        <p:nvSpPr>
+          <p:cNvPr id="3" name="Espace réservé des commentaires 2"/>
+          <p:cNvSpPr>
+            <a:spLocks noGrp="1"/>
+          </p:cNvSpPr>
+          <p:nvPr>
+            <p:ph type="body" idx="1"/>
+          </p:nvPr>
+        </p:nvSpPr>
+        <p:spPr/>
+        <p:txBody>
+          <a:bodyPr/>
+          <a:lstStyle/>
+          <a:p>
+            <a:r>
+              <a:rPr lang="fr-FR" dirty="0" smtClean="0"/>
+              <a:t>Sans adaptation le germe</a:t>
+            </a:r>
+            <a:r>
+              <a:rPr lang="fr-FR" baseline="0" dirty="0" smtClean="0"/>
+              <a:t> se trouve dans la tumeur donc le résultat est totalement faux.</a:t>
+            </a:r>
+            <a:br>
+              <a:rPr lang="fr-FR" baseline="0" dirty="0" smtClean="0"/>
+            </a:br>
+            <a:r>
+              <a:rPr lang="fr-FR" baseline="0" dirty="0" smtClean="0"/>
+              <a:t>Avec adaptation même si il manque du rein, c’est déjà beaucoup mieux</a:t>
+            </a:r>
+            <a:endParaRPr lang="fr-FR" dirty="0"/>
+          </a:p>
+        </p:txBody>
+      </p:sp>
+      <p:sp>
+        <p:nvSpPr>
+          <p:cNvPr id="4" name="Espace réservé du numéro de diapositive 3"/>
+          <p:cNvSpPr>
+            <a:spLocks noGrp="1"/>
+          </p:cNvSpPr>
+          <p:nvPr>
+            <p:ph type="sldNum" sz="quarter" idx="10"/>
+          </p:nvPr>
+        </p:nvSpPr>
+        <p:spPr/>
+        <p:txBody>
+          <a:bodyPr/>
+          <a:lstStyle/>
+          <a:p>
+            <a:fld id="{187221B9-9FE5-432F-A9DE-276993DF5943}" type="slidenum">
+              <a:rPr lang="fr-FR" smtClean="0"/>
+              <a:t>18</a:t>
+            </a:fld>
+            <a:endParaRPr lang="fr-FR"/>
+          </a:p>
+        </p:txBody>
+      </p:sp>
+    </p:spTree>
+    <p:extLst>
+      <p:ext uri="{BB962C8B-B14F-4D97-AF65-F5344CB8AC3E}">
+        <p14:creationId xmlns:p14="http://schemas.microsoft.com/office/powerpoint/2010/main" val="2387181452"/>
+      </p:ext>
+    </p:extLst>
+  </p:cSld>
+  <p:clrMapOvr>
+    <a:masterClrMapping/>
+  </p:clrMapOvr>
+</p:notes>
+</file>
+
+<file path=ppt/notesSlides/notesSlide13.xml><?xml version="1.0" encoding="utf-8"?>
+<p:notes xmlns:a="http://schemas.openxmlformats.org/drawingml/2006/main" xmlns:r="http://schemas.openxmlformats.org/officeDocument/2006/relationships" xmlns:p="http://schemas.openxmlformats.org/presentationml/2006/main">
+  <p:cSld>
+    <p:spTree>
+      <p:nvGrpSpPr>
+        <p:cNvPr id="1" name=""/>
+        <p:cNvGrpSpPr/>
+        <p:nvPr/>
+      </p:nvGrpSpPr>
+      <p:grpSpPr>
+        <a:xfrm>
+          <a:off x="0" y="0"/>
+          <a:ext cx="0" cy="0"/>
+          <a:chOff x="0" y="0"/>
+          <a:chExt cx="0" cy="0"/>
+        </a:xfrm>
+      </p:grpSpPr>
+      <p:sp>
+        <p:nvSpPr>
+          <p:cNvPr id="2" name="Espace réservé de l'image des diapositives 1"/>
+          <p:cNvSpPr>
+            <a:spLocks noGrp="1" noRot="1" noChangeAspect="1"/>
+          </p:cNvSpPr>
+          <p:nvPr>
+            <p:ph type="sldImg"/>
+          </p:nvPr>
+        </p:nvSpPr>
+        <p:spPr/>
+      </p:sp>
+      <p:sp>
+        <p:nvSpPr>
+          <p:cNvPr id="3" name="Espace réservé des commentaires 2"/>
+          <p:cNvSpPr>
+            <a:spLocks noGrp="1"/>
+          </p:cNvSpPr>
+          <p:nvPr>
+            <p:ph type="body" idx="1"/>
+          </p:nvPr>
+        </p:nvSpPr>
+        <p:spPr/>
+        <p:txBody>
+          <a:bodyPr/>
+          <a:lstStyle/>
+          <a:p>
+            <a:r>
+              <a:rPr lang="fr-FR" baseline="0" dirty="0" smtClean="0">
+                <a:sym typeface="Wingdings" panose="05000000000000000000" pitchFamily="2" charset="2"/>
+              </a:rPr>
+              <a:t>	</a:t>
+            </a:r>
+          </a:p>
+        </p:txBody>
+      </p:sp>
+      <p:sp>
+        <p:nvSpPr>
+          <p:cNvPr id="4" name="Espace réservé du numéro de diapositive 3"/>
+          <p:cNvSpPr>
+            <a:spLocks noGrp="1"/>
+          </p:cNvSpPr>
+          <p:nvPr>
+            <p:ph type="sldNum" sz="quarter" idx="10"/>
+          </p:nvPr>
+        </p:nvSpPr>
+        <p:spPr/>
+        <p:txBody>
+          <a:bodyPr/>
+          <a:lstStyle/>
+          <a:p>
+            <a:fld id="{5984FE70-0D1D-40C7-9F56-3FAF97D50752}" type="slidenum">
+              <a:rPr lang="fr-FR" smtClean="0"/>
+              <a:t>20</a:t>
+            </a:fld>
+            <a:endParaRPr lang="fr-FR"/>
+          </a:p>
+        </p:txBody>
+      </p:sp>
+    </p:spTree>
+    <p:extLst>
+      <p:ext uri="{BB962C8B-B14F-4D97-AF65-F5344CB8AC3E}">
+        <p14:creationId xmlns:p14="http://schemas.microsoft.com/office/powerpoint/2010/main" val="4163996034"/>
+      </p:ext>
+    </p:extLst>
+  </p:cSld>
+  <p:clrMapOvr>
+    <a:masterClrMapping/>
+  </p:clrMapOvr>
+</p:notes>
+</file>
+
 <file path=ppt/notesSlides/notesSlide2.xml><?xml version="1.0" encoding="utf-8"?>
 <p:notes xmlns:a="http://schemas.openxmlformats.org/drawingml/2006/main" xmlns:r="http://schemas.openxmlformats.org/officeDocument/2006/relationships" xmlns:p="http://schemas.openxmlformats.org/presentationml/2006/main">
   <p:cSld>
@@ -813,7 +1184,26 @@
           <a:bodyPr/>
           <a:lstStyle/>
           <a:p>
-            <a:endParaRPr lang="fr-FR" dirty="0"/>
+            <a:r>
+              <a:rPr lang="fr-FR" dirty="0" smtClean="0"/>
+              <a:t>Une image</a:t>
+            </a:r>
+            <a:r>
+              <a:rPr lang="fr-FR" baseline="0" dirty="0" smtClean="0"/>
+              <a:t> très semblable au nouveau cas mais présentant une tumeur au mauvais endroit est tout de même exploitable pour les seuils de la croissance de régions</a:t>
+            </a:r>
+          </a:p>
+          <a:p>
+            <a:r>
+              <a:rPr lang="fr-FR" baseline="0" dirty="0" smtClean="0"/>
+              <a:t>Une image très différente mais ayant une disposition des organes semblable est très utile pour positionner les germes</a:t>
+            </a:r>
+          </a:p>
+          <a:p>
+            <a:r>
+              <a:rPr lang="fr-FR" baseline="0" dirty="0" smtClean="0"/>
+              <a:t>Voila pourquoi on fait un double RàPC</a:t>
+            </a:r>
           </a:p>
         </p:txBody>
       </p:sp>
@@ -834,7 +1224,7 @@
           <a:p>
             <a:fld id="{187221B9-9FE5-432F-A9DE-276993DF5943}" type="slidenum">
               <a:rPr lang="fr-FR" smtClean="0"/>
-              <a:t>11</a:t>
+              <a:t>7</a:t>
             </a:fld>
             <a:endParaRPr lang="fr-FR"/>
           </a:p>
@@ -843,7 +1233,7 @@
     </p:spTree>
     <p:extLst>
       <p:ext uri="{BB962C8B-B14F-4D97-AF65-F5344CB8AC3E}">
-        <p14:creationId xmlns:p14="http://schemas.microsoft.com/office/powerpoint/2010/main" val="3856053518"/>
+        <p14:creationId xmlns:p14="http://schemas.microsoft.com/office/powerpoint/2010/main" val="1883069219"/>
       </p:ext>
     </p:extLst>
   </p:cSld>
@@ -897,28 +1287,14 @@
           <a:bodyPr/>
           <a:lstStyle/>
           <a:p>
-            <a:pPr marL="0" indent="0">
-              <a:buNone/>
-            </a:pPr>
-            <a:r>
-              <a:rPr lang="fr-FR" sz="1200" b="1" dirty="0" smtClean="0"/>
-              <a:t>Ontologie</a:t>
-            </a:r>
-            <a:r>
-              <a:rPr lang="fr-FR" sz="1200" dirty="0" smtClean="0"/>
-              <a:t> : « Spécification formelle et explicite d’une conceptualisation partagée »</a:t>
-            </a:r>
-          </a:p>
-          <a:p>
-            <a:pPr marL="0" indent="0">
-              <a:buNone/>
-            </a:pPr>
-            <a:r>
-              <a:rPr lang="fr-FR" sz="1200" dirty="0" smtClean="0"/>
-              <a:t>= Représentation des connaissances dans un domaine.</a:t>
-            </a:r>
-          </a:p>
-          <a:p>
+            <a:r>
+              <a:rPr lang="fr-FR" dirty="0" smtClean="0"/>
+              <a:t>A savoir que pour le</a:t>
+            </a:r>
+            <a:r>
+              <a:rPr lang="fr-FR" baseline="0" dirty="0" smtClean="0"/>
+              <a:t> sexe qui n’est pas à priori une donnée métrique on peut définir M = 1, F = 0 par exemple</a:t>
+            </a:r>
             <a:endParaRPr lang="fr-FR" dirty="0"/>
           </a:p>
         </p:txBody>
@@ -940,7 +1316,7 @@
           <a:p>
             <a:fld id="{187221B9-9FE5-432F-A9DE-276993DF5943}" type="slidenum">
               <a:rPr lang="fr-FR" smtClean="0"/>
-              <a:t>12</a:t>
+              <a:t>10</a:t>
             </a:fld>
             <a:endParaRPr lang="fr-FR"/>
           </a:p>
@@ -949,7 +1325,7 @@
     </p:spTree>
     <p:extLst>
       <p:ext uri="{BB962C8B-B14F-4D97-AF65-F5344CB8AC3E}">
-        <p14:creationId xmlns:p14="http://schemas.microsoft.com/office/powerpoint/2010/main" val="1551256708"/>
+        <p14:creationId xmlns:p14="http://schemas.microsoft.com/office/powerpoint/2010/main" val="3271467623"/>
       </p:ext>
     </p:extLst>
   </p:cSld>
@@ -1003,10 +1379,6 @@
           <a:bodyPr/>
           <a:lstStyle/>
           <a:p>
-            <a:r>
-              <a:rPr lang="fr-FR" dirty="0" smtClean="0"/>
-              <a:t>Fusion de relations spatiales</a:t>
-            </a:r>
             <a:endParaRPr lang="fr-FR" dirty="0"/>
           </a:p>
         </p:txBody>
@@ -1028,7 +1400,7 @@
           <a:p>
             <a:fld id="{187221B9-9FE5-432F-A9DE-276993DF5943}" type="slidenum">
               <a:rPr lang="fr-FR" smtClean="0"/>
-              <a:t>13</a:t>
+              <a:t>11</a:t>
             </a:fld>
             <a:endParaRPr lang="fr-FR"/>
           </a:p>
@@ -1037,7 +1409,7 @@
     </p:spTree>
     <p:extLst>
       <p:ext uri="{BB962C8B-B14F-4D97-AF65-F5344CB8AC3E}">
-        <p14:creationId xmlns:p14="http://schemas.microsoft.com/office/powerpoint/2010/main" val="1119492539"/>
+        <p14:creationId xmlns:p14="http://schemas.microsoft.com/office/powerpoint/2010/main" val="3856053518"/>
       </p:ext>
     </p:extLst>
   </p:cSld>
@@ -1091,6 +1463,135 @@
           <a:bodyPr/>
           <a:lstStyle/>
           <a:p>
+            <a:pPr marL="0" indent="0">
+              <a:buNone/>
+            </a:pPr>
+            <a:r>
+              <a:rPr lang="fr-FR" sz="1200" b="1" dirty="0" smtClean="0"/>
+              <a:t>Ontologie</a:t>
+            </a:r>
+            <a:r>
+              <a:rPr lang="fr-FR" sz="1200" dirty="0" smtClean="0"/>
+              <a:t> : « Spécification formelle et explicite d’une conceptualisation partagée »</a:t>
+            </a:r>
+          </a:p>
+          <a:p>
+            <a:pPr marL="0" indent="0">
+              <a:buNone/>
+            </a:pPr>
+            <a:r>
+              <a:rPr lang="fr-FR" sz="1200" dirty="0" smtClean="0"/>
+              <a:t>= Représentation des connaissances dans un domaine</a:t>
+            </a:r>
+            <a:r>
+              <a:rPr lang="fr-FR" sz="1200" dirty="0" smtClean="0"/>
+              <a:t>.</a:t>
+            </a:r>
+          </a:p>
+          <a:p>
+            <a:pPr marL="0" indent="0">
+              <a:buNone/>
+            </a:pPr>
+            <a:endParaRPr lang="fr-FR" sz="1200" dirty="0" smtClean="0"/>
+          </a:p>
+          <a:p>
+            <a:pPr marL="0" indent="0">
+              <a:buNone/>
+            </a:pPr>
+            <a:r>
+              <a:rPr lang="fr-FR" sz="1200" dirty="0" smtClean="0"/>
+              <a:t>Si</a:t>
+            </a:r>
+            <a:r>
+              <a:rPr lang="fr-FR" sz="1200" baseline="0" dirty="0" smtClean="0"/>
+              <a:t> on a comme information « Tumeur </a:t>
+            </a:r>
+            <a:r>
+              <a:rPr lang="fr-FR" sz="1200" baseline="0" dirty="0" err="1" smtClean="0"/>
+              <a:t>aGaucheDe</a:t>
+            </a:r>
+            <a:r>
+              <a:rPr lang="fr-FR" sz="1200" baseline="0" dirty="0" smtClean="0"/>
+              <a:t> Colonne » « Tumeur </a:t>
+            </a:r>
+            <a:r>
+              <a:rPr lang="fr-FR" sz="1200" baseline="0" dirty="0" err="1" smtClean="0"/>
+              <a:t>aDroiteDe</a:t>
+            </a:r>
+            <a:r>
+              <a:rPr lang="fr-FR" sz="1200" baseline="0" dirty="0" smtClean="0"/>
+              <a:t> </a:t>
+            </a:r>
+            <a:r>
+              <a:rPr lang="fr-FR" sz="1200" baseline="0" dirty="0" err="1" smtClean="0"/>
+              <a:t>ReinDroit</a:t>
+            </a:r>
+            <a:r>
+              <a:rPr lang="fr-FR" sz="1200" baseline="0" dirty="0" smtClean="0"/>
+              <a:t> » « Tumeur </a:t>
+            </a:r>
+            <a:r>
+              <a:rPr lang="fr-FR" sz="1200" baseline="0" dirty="0" err="1" smtClean="0"/>
+              <a:t>procheDe</a:t>
+            </a:r>
+            <a:r>
+              <a:rPr lang="fr-FR" sz="1200" baseline="0" dirty="0" smtClean="0"/>
+              <a:t> Colonne »</a:t>
+            </a:r>
+          </a:p>
+          <a:p>
+            <a:pPr marL="0" indent="0">
+              <a:buNone/>
+            </a:pPr>
+            <a:r>
+              <a:rPr lang="fr-FR" sz="1200" baseline="0" dirty="0" smtClean="0"/>
+              <a:t>On va pouvoir comparer cela à un autre cas similaire mais formé comme suit : « Tumeur </a:t>
+            </a:r>
+            <a:r>
+              <a:rPr lang="fr-FR" sz="1200" baseline="0" dirty="0" err="1" smtClean="0"/>
+              <a:t>aDoiteDe</a:t>
+            </a:r>
+            <a:r>
+              <a:rPr lang="fr-FR" sz="1200" baseline="0" dirty="0" smtClean="0"/>
+              <a:t> </a:t>
+            </a:r>
+            <a:r>
+              <a:rPr lang="fr-FR" sz="1200" baseline="0" dirty="0" err="1" smtClean="0"/>
+              <a:t>ReinDroit</a:t>
+            </a:r>
+            <a:r>
+              <a:rPr lang="fr-FR" sz="1200" baseline="0" dirty="0" smtClean="0"/>
+              <a:t> » « Tumeur </a:t>
+            </a:r>
+            <a:r>
+              <a:rPr lang="fr-FR" sz="1200" baseline="0" dirty="0" err="1" smtClean="0"/>
+              <a:t>MoyennementProcheDe</a:t>
+            </a:r>
+            <a:r>
+              <a:rPr lang="fr-FR" sz="1200" baseline="0" dirty="0" smtClean="0"/>
+              <a:t> </a:t>
+            </a:r>
+            <a:r>
+              <a:rPr lang="fr-FR" sz="1200" baseline="0" dirty="0" err="1" smtClean="0"/>
+              <a:t>ReinDroit</a:t>
+            </a:r>
+            <a:r>
+              <a:rPr lang="fr-FR" sz="1200" baseline="0" dirty="0" smtClean="0"/>
+              <a:t> »</a:t>
+            </a:r>
+          </a:p>
+          <a:p>
+            <a:pPr marL="0" indent="0">
+              <a:buNone/>
+            </a:pPr>
+            <a:r>
+              <a:rPr lang="fr-FR" sz="1200" baseline="0" dirty="0" smtClean="0"/>
+              <a:t>Qui donne environ la même </a:t>
+            </a:r>
+            <a:r>
+              <a:rPr lang="fr-FR" sz="1200" baseline="0" dirty="0" err="1" smtClean="0"/>
+              <a:t>chôse</a:t>
+            </a:r>
             <a:endParaRPr lang="fr-FR" dirty="0"/>
           </a:p>
         </p:txBody>
@@ -1112,7 +1613,7 @@
           <a:p>
             <a:fld id="{187221B9-9FE5-432F-A9DE-276993DF5943}" type="slidenum">
               <a:rPr lang="fr-FR" smtClean="0"/>
-              <a:t>15</a:t>
+              <a:t>12</a:t>
             </a:fld>
             <a:endParaRPr lang="fr-FR"/>
           </a:p>
@@ -1121,7 +1622,7 @@
     </p:spTree>
     <p:extLst>
       <p:ext uri="{BB962C8B-B14F-4D97-AF65-F5344CB8AC3E}">
-        <p14:creationId xmlns:p14="http://schemas.microsoft.com/office/powerpoint/2010/main" val="3397968410"/>
+        <p14:creationId xmlns:p14="http://schemas.microsoft.com/office/powerpoint/2010/main" val="1551256708"/>
       </p:ext>
     </p:extLst>
   </p:cSld>
@@ -1176,11 +1677,10 @@
           <a:lstStyle/>
           <a:p>
             <a:r>
-              <a:rPr lang="fr-FR" baseline="0" dirty="0" smtClean="0">
-                <a:sym typeface="Wingdings" panose="05000000000000000000" pitchFamily="2" charset="2"/>
-              </a:rPr>
-              <a:t>	</a:t>
-            </a:r>
+              <a:rPr lang="fr-FR" dirty="0" smtClean="0"/>
+              <a:t>Fusion de relations spatiales</a:t>
+            </a:r>
+            <a:endParaRPr lang="fr-FR" dirty="0"/>
           </a:p>
         </p:txBody>
       </p:sp>
@@ -1199,9 +1699,9 @@
           <a:bodyPr/>
           <a:lstStyle/>
           <a:p>
-            <a:fld id="{5984FE70-0D1D-40C7-9F56-3FAF97D50752}" type="slidenum">
+            <a:fld id="{187221B9-9FE5-432F-A9DE-276993DF5943}" type="slidenum">
               <a:rPr lang="fr-FR" smtClean="0"/>
-              <a:t>19</a:t>
+              <a:t>13</a:t>
             </a:fld>
             <a:endParaRPr lang="fr-FR"/>
           </a:p>
@@ -1210,7 +1710,95 @@
     </p:spTree>
     <p:extLst>
       <p:ext uri="{BB962C8B-B14F-4D97-AF65-F5344CB8AC3E}">
-        <p14:creationId xmlns:p14="http://schemas.microsoft.com/office/powerpoint/2010/main" val="4163996034"/>
+        <p14:creationId xmlns:p14="http://schemas.microsoft.com/office/powerpoint/2010/main" val="1119492539"/>
+      </p:ext>
+    </p:extLst>
+  </p:cSld>
+  <p:clrMapOvr>
+    <a:masterClrMapping/>
+  </p:clrMapOvr>
+</p:notes>
+</file>
+
+<file path=ppt/notesSlides/notesSlide9.xml><?xml version="1.0" encoding="utf-8"?>
+<p:notes xmlns:a="http://schemas.openxmlformats.org/drawingml/2006/main" xmlns:r="http://schemas.openxmlformats.org/officeDocument/2006/relationships" xmlns:p="http://schemas.openxmlformats.org/presentationml/2006/main">
+  <p:cSld>
+    <p:spTree>
+      <p:nvGrpSpPr>
+        <p:cNvPr id="1" name=""/>
+        <p:cNvGrpSpPr/>
+        <p:nvPr/>
+      </p:nvGrpSpPr>
+      <p:grpSpPr>
+        <a:xfrm>
+          <a:off x="0" y="0"/>
+          <a:ext cx="0" cy="0"/>
+          <a:chOff x="0" y="0"/>
+          <a:chExt cx="0" cy="0"/>
+        </a:xfrm>
+      </p:grpSpPr>
+      <p:sp>
+        <p:nvSpPr>
+          <p:cNvPr id="2" name="Espace réservé de l'image des diapositives 1"/>
+          <p:cNvSpPr>
+            <a:spLocks noGrp="1" noRot="1" noChangeAspect="1"/>
+          </p:cNvSpPr>
+          <p:nvPr>
+            <p:ph type="sldImg"/>
+          </p:nvPr>
+        </p:nvSpPr>
+        <p:spPr/>
+      </p:sp>
+      <p:sp>
+        <p:nvSpPr>
+          <p:cNvPr id="3" name="Espace réservé des commentaires 2"/>
+          <p:cNvSpPr>
+            <a:spLocks noGrp="1"/>
+          </p:cNvSpPr>
+          <p:nvPr>
+            <p:ph type="body" idx="1"/>
+          </p:nvPr>
+        </p:nvSpPr>
+        <p:spPr/>
+        <p:txBody>
+          <a:bodyPr/>
+          <a:lstStyle/>
+          <a:p>
+            <a:r>
+              <a:rPr lang="fr-FR" dirty="0" smtClean="0"/>
+              <a:t>Après une itération des voisin direct on recommence avec les voisions à deux crans, trois crans, etc.</a:t>
+            </a:r>
+            <a:endParaRPr lang="fr-FR" dirty="0"/>
+          </a:p>
+        </p:txBody>
+      </p:sp>
+      <p:sp>
+        <p:nvSpPr>
+          <p:cNvPr id="4" name="Espace réservé du numéro de diapositive 3"/>
+          <p:cNvSpPr>
+            <a:spLocks noGrp="1"/>
+          </p:cNvSpPr>
+          <p:nvPr>
+            <p:ph type="sldNum" sz="quarter" idx="10"/>
+          </p:nvPr>
+        </p:nvSpPr>
+        <p:spPr/>
+        <p:txBody>
+          <a:bodyPr/>
+          <a:lstStyle/>
+          <a:p>
+            <a:fld id="{187221B9-9FE5-432F-A9DE-276993DF5943}" type="slidenum">
+              <a:rPr lang="fr-FR" smtClean="0"/>
+              <a:t>14</a:t>
+            </a:fld>
+            <a:endParaRPr lang="fr-FR"/>
+          </a:p>
+        </p:txBody>
+      </p:sp>
+    </p:spTree>
+    <p:extLst>
+      <p:ext uri="{BB962C8B-B14F-4D97-AF65-F5344CB8AC3E}">
+        <p14:creationId xmlns:p14="http://schemas.microsoft.com/office/powerpoint/2010/main" val="1920257251"/>
       </p:ext>
     </p:extLst>
   </p:cSld>
@@ -1722,7 +2310,7 @@
           <a:p>
             <a:fld id="{1A464316-5A27-4FEC-B358-C0D92F8D80B5}" type="datetimeFigureOut">
               <a:rPr lang="fr-FR" smtClean="0"/>
-              <a:t>03/07/2017</a:t>
+              <a:t>04/07/2017</a:t>
             </a:fld>
             <a:endParaRPr lang="fr-FR"/>
           </a:p>
@@ -2018,7 +2606,7 @@
           <a:p>
             <a:fld id="{1A464316-5A27-4FEC-B358-C0D92F8D80B5}" type="datetimeFigureOut">
               <a:rPr lang="fr-FR" smtClean="0"/>
-              <a:t>03/07/2017</a:t>
+              <a:t>04/07/2017</a:t>
             </a:fld>
             <a:endParaRPr lang="fr-FR"/>
           </a:p>
@@ -2266,7 +2854,7 @@
           <a:p>
             <a:fld id="{1A464316-5A27-4FEC-B358-C0D92F8D80B5}" type="datetimeFigureOut">
               <a:rPr lang="fr-FR" smtClean="0"/>
-              <a:t>03/07/2017</a:t>
+              <a:t>04/07/2017</a:t>
             </a:fld>
             <a:endParaRPr lang="fr-FR"/>
           </a:p>
@@ -2806,7 +3394,7 @@
           <a:p>
             <a:fld id="{1A464316-5A27-4FEC-B358-C0D92F8D80B5}" type="datetimeFigureOut">
               <a:rPr lang="fr-FR" smtClean="0"/>
-              <a:t>03/07/2017</a:t>
+              <a:t>04/07/2017</a:t>
             </a:fld>
             <a:endParaRPr lang="fr-FR"/>
           </a:p>
@@ -3054,7 +3642,7 @@
           <a:p>
             <a:fld id="{1A464316-5A27-4FEC-B358-C0D92F8D80B5}" type="datetimeFigureOut">
               <a:rPr lang="fr-FR" smtClean="0"/>
-              <a:t>03/07/2017</a:t>
+              <a:t>04/07/2017</a:t>
             </a:fld>
             <a:endParaRPr lang="fr-FR"/>
           </a:p>
@@ -3586,7 +4174,7 @@
           <a:p>
             <a:fld id="{1A464316-5A27-4FEC-B358-C0D92F8D80B5}" type="datetimeFigureOut">
               <a:rPr lang="fr-FR" smtClean="0"/>
-              <a:t>03/07/2017</a:t>
+              <a:t>04/07/2017</a:t>
             </a:fld>
             <a:endParaRPr lang="fr-FR"/>
           </a:p>
@@ -3883,7 +4471,7 @@
           <a:p>
             <a:fld id="{1A464316-5A27-4FEC-B358-C0D92F8D80B5}" type="datetimeFigureOut">
               <a:rPr lang="fr-FR" smtClean="0"/>
-              <a:t>03/07/2017</a:t>
+              <a:t>04/07/2017</a:t>
             </a:fld>
             <a:endParaRPr lang="fr-FR"/>
           </a:p>
@@ -4057,7 +4645,7 @@
           <a:p>
             <a:fld id="{1A464316-5A27-4FEC-B358-C0D92F8D80B5}" type="datetimeFigureOut">
               <a:rPr lang="fr-FR" smtClean="0"/>
-              <a:t>03/07/2017</a:t>
+              <a:t>04/07/2017</a:t>
             </a:fld>
             <a:endParaRPr lang="fr-FR"/>
           </a:p>
@@ -4237,7 +4825,7 @@
           <a:p>
             <a:fld id="{1A464316-5A27-4FEC-B358-C0D92F8D80B5}" type="datetimeFigureOut">
               <a:rPr lang="fr-FR" smtClean="0"/>
-              <a:t>03/07/2017</a:t>
+              <a:t>04/07/2017</a:t>
             </a:fld>
             <a:endParaRPr lang="fr-FR"/>
           </a:p>
@@ -4407,7 +4995,7 @@
           <a:p>
             <a:fld id="{1A464316-5A27-4FEC-B358-C0D92F8D80B5}" type="datetimeFigureOut">
               <a:rPr lang="fr-FR" smtClean="0"/>
-              <a:t>03/07/2017</a:t>
+              <a:t>04/07/2017</a:t>
             </a:fld>
             <a:endParaRPr lang="fr-FR"/>
           </a:p>
@@ -4658,7 +5246,7 @@
           <a:p>
             <a:fld id="{1A464316-5A27-4FEC-B358-C0D92F8D80B5}" type="datetimeFigureOut">
               <a:rPr lang="fr-FR" smtClean="0"/>
-              <a:t>03/07/2017</a:t>
+              <a:t>04/07/2017</a:t>
             </a:fld>
             <a:endParaRPr lang="fr-FR"/>
           </a:p>
@@ -4955,7 +5543,7 @@
           <a:p>
             <a:fld id="{1A464316-5A27-4FEC-B358-C0D92F8D80B5}" type="datetimeFigureOut">
               <a:rPr lang="fr-FR" smtClean="0"/>
-              <a:t>03/07/2017</a:t>
+              <a:t>04/07/2017</a:t>
             </a:fld>
             <a:endParaRPr lang="fr-FR"/>
           </a:p>
@@ -5397,7 +5985,7 @@
           <a:p>
             <a:fld id="{1A464316-5A27-4FEC-B358-C0D92F8D80B5}" type="datetimeFigureOut">
               <a:rPr lang="fr-FR" smtClean="0"/>
-              <a:t>03/07/2017</a:t>
+              <a:t>04/07/2017</a:t>
             </a:fld>
             <a:endParaRPr lang="fr-FR"/>
           </a:p>
@@ -5515,7 +6103,7 @@
           <a:p>
             <a:fld id="{1A464316-5A27-4FEC-B358-C0D92F8D80B5}" type="datetimeFigureOut">
               <a:rPr lang="fr-FR" smtClean="0"/>
-              <a:t>03/07/2017</a:t>
+              <a:t>04/07/2017</a:t>
             </a:fld>
             <a:endParaRPr lang="fr-FR"/>
           </a:p>
@@ -5610,7 +6198,7 @@
           <a:p>
             <a:fld id="{1A464316-5A27-4FEC-B358-C0D92F8D80B5}" type="datetimeFigureOut">
               <a:rPr lang="fr-FR" smtClean="0"/>
-              <a:t>03/07/2017</a:t>
+              <a:t>04/07/2017</a:t>
             </a:fld>
             <a:endParaRPr lang="fr-FR"/>
           </a:p>
@@ -5893,7 +6481,7 @@
           <a:p>
             <a:fld id="{1A464316-5A27-4FEC-B358-C0D92F8D80B5}" type="datetimeFigureOut">
               <a:rPr lang="fr-FR" smtClean="0"/>
-              <a:t>03/07/2017</a:t>
+              <a:t>04/07/2017</a:t>
             </a:fld>
             <a:endParaRPr lang="fr-FR"/>
           </a:p>
@@ -6184,7 +6772,7 @@
           <a:p>
             <a:fld id="{1A464316-5A27-4FEC-B358-C0D92F8D80B5}" type="datetimeFigureOut">
               <a:rPr lang="fr-FR" smtClean="0"/>
-              <a:t>03/07/2017</a:t>
+              <a:t>04/07/2017</a:t>
             </a:fld>
             <a:endParaRPr lang="fr-FR"/>
           </a:p>
@@ -6714,7 +7302,7 @@
           <a:p>
             <a:fld id="{1A464316-5A27-4FEC-B358-C0D92F8D80B5}" type="datetimeFigureOut">
               <a:rPr lang="fr-FR" smtClean="0"/>
-              <a:t>03/07/2017</a:t>
+              <a:t>04/07/2017</a:t>
             </a:fld>
             <a:endParaRPr lang="fr-FR"/>
           </a:p>
@@ -7340,8 +7928,8 @@
           </a:p>
         </p:txBody>
       </p:sp>
-      <mc:AlternateContent xmlns:mc="http://schemas.openxmlformats.org/markup-compatibility/2006">
-        <mc:Choice xmlns:a14="http://schemas.microsoft.com/office/drawing/2010/main" Requires="a14">
+      <mc:AlternateContent xmlns:mc="http://schemas.openxmlformats.org/markup-compatibility/2006" xmlns:a14="http://schemas.microsoft.com/office/drawing/2010/main">
+        <mc:Choice Requires="a14">
           <p:sp>
             <p:nvSpPr>
               <p:cNvPr id="3" name="Espace réservé du contenu 2"/>
@@ -7910,7 +8498,7 @@
             </p:txBody>
           </p:sp>
         </mc:Choice>
-        <mc:Fallback>
+        <mc:Fallback xmlns="">
           <p:sp>
             <p:nvSpPr>
               <p:cNvPr id="3" name="Espace réservé du contenu 2"/>
@@ -7927,7 +8515,7 @@
                 <a:ext cx="10018713" cy="5029200"/>
               </a:xfrm>
               <a:blipFill rotWithShape="0">
-                <a:blip r:embed="rId2"/>
+                <a:blip r:embed="rId3"/>
                 <a:stretch>
                   <a:fillRect l="-1338" t="-1818"/>
                 </a:stretch>
@@ -8305,11 +8893,7 @@
           <a:p>
             <a:r>
               <a:rPr lang="fr-FR" sz="1500" dirty="0" smtClean="0"/>
-              <a:t>Exemple de conversion </a:t>
-            </a:r>
-            <a:r>
-              <a:rPr lang="fr-FR" sz="1500" dirty="0" smtClean="0"/>
-              <a:t>binaire de deux caractéristiques</a:t>
+              <a:t>Exemple de conversion binaire de deux caractéristiques</a:t>
             </a:r>
             <a:endParaRPr lang="fr-FR" sz="1500" dirty="0"/>
           </a:p>
@@ -8412,7 +8996,6 @@
               <a:rPr lang="fr-FR" b="1" dirty="0" smtClean="0"/>
               <a:t>Deuxième RàPC pour la position des organes (germes)</a:t>
             </a:r>
-            <a:endParaRPr lang="fr-FR" b="1" dirty="0" smtClean="0"/>
           </a:p>
           <a:p>
             <a:r>
@@ -8972,11 +9555,7 @@
           <a:p>
             <a:r>
               <a:rPr lang="fr-FR" dirty="0" smtClean="0"/>
-              <a:t>Par </a:t>
-            </a:r>
-            <a:r>
-              <a:rPr lang="fr-FR" dirty="0" smtClean="0"/>
-              <a:t>rapport à un Point de référence au centre de l’image (blanc = 1, noir = 0)</a:t>
+              <a:t>Par rapport à un Point de référence au centre de l’image (blanc = 1, noir = 0)</a:t>
             </a:r>
             <a:endParaRPr lang="fr-FR" dirty="0"/>
           </a:p>
@@ -9221,28 +9800,14 @@
                 <a:latin typeface="Cambria Math" panose="02040503050406030204" pitchFamily="18" charset="0"/>
                 <a:ea typeface="Cambria Math" panose="02040503050406030204" pitchFamily="18" charset="0"/>
               </a:rPr>
-              <a:t>	</a:t>
-            </a:r>
-            <a:r>
-              <a:rPr lang="fr-FR" sz="2000" dirty="0">
-                <a:latin typeface="Cambria Math" panose="02040503050406030204" pitchFamily="18" charset="0"/>
-                <a:ea typeface="Cambria Math" panose="02040503050406030204" pitchFamily="18" charset="0"/>
-              </a:rPr>
-              <a:t> </a:t>
+              <a:t>	 </a:t>
             </a:r>
             <a:r>
               <a:rPr lang="fr-FR" sz="2000" dirty="0" smtClean="0">
                 <a:latin typeface="Cambria Math" panose="02040503050406030204" pitchFamily="18" charset="0"/>
                 <a:ea typeface="Cambria Math" panose="02040503050406030204" pitchFamily="18" charset="0"/>
               </a:rPr>
-              <a:t>      </a:t>
-            </a:r>
-            <a:r>
-              <a:rPr lang="fr-FR" sz="2000" dirty="0" smtClean="0">
-                <a:latin typeface="Cambria Math" panose="02040503050406030204" pitchFamily="18" charset="0"/>
-                <a:ea typeface="Cambria Math" panose="02040503050406030204" pitchFamily="18" charset="0"/>
-              </a:rPr>
-              <a:t>« </a:t>
+              <a:t>      « </a:t>
             </a:r>
             <a:r>
               <a:rPr lang="fr-FR" sz="2000" dirty="0" err="1" smtClean="0">
@@ -9292,7 +9857,6 @@
               <a:rPr lang="fr-FR" dirty="0" smtClean="0"/>
               <a:t>Positionnement flou de la tumeur stocké dans chaque cas</a:t>
             </a:r>
-            <a:endParaRPr lang="fr-FR" dirty="0" smtClean="0"/>
           </a:p>
           <a:p>
             <a:r>
@@ -9834,15 +10398,7 @@
           <a:p>
             <a:r>
               <a:rPr lang="fr-FR" dirty="0" smtClean="0"/>
-              <a:t>Le germe est à placer au degré le plus élevé </a:t>
-            </a:r>
-            <a:r>
-              <a:rPr lang="fr-FR" dirty="0" smtClean="0"/>
-              <a:t>(pixel le </a:t>
-            </a:r>
-            <a:r>
-              <a:rPr lang="fr-FR" dirty="0" smtClean="0"/>
-              <a:t>plus blanc)</a:t>
+              <a:t>Le germe est à placer au degré le plus élevé (pixel le plus blanc)</a:t>
             </a:r>
             <a:endParaRPr lang="fr-FR" dirty="0"/>
           </a:p>
@@ -10022,12 +10578,12 @@
           <a:graphicData uri="http://schemas.openxmlformats.org/presentationml/2006/ole">
             <mc:AlternateContent xmlns:mc="http://schemas.openxmlformats.org/markup-compatibility/2006">
               <mc:Choice xmlns:v="urn:schemas-microsoft-com:vml" Requires="v">
-                <p:oleObj spid="_x0000_s2189" name="Feuille de calcul" r:id="rId3" imgW="2390799" imgH="2390895" progId="Excel.Sheet.12">
+                <p:oleObj spid="_x0000_s2241" name="Feuille de calcul" r:id="rId4" imgW="2390799" imgH="2390895" progId="Excel.Sheet.12">
                   <p:embed/>
                 </p:oleObj>
               </mc:Choice>
               <mc:Fallback>
-                <p:oleObj name="Feuille de calcul" r:id="rId3" imgW="2390799" imgH="2390895" progId="Excel.Sheet.12">
+                <p:oleObj name="Feuille de calcul" r:id="rId4" imgW="2390799" imgH="2390895" progId="Excel.Sheet.12">
                   <p:embed/>
                   <p:pic>
                     <p:nvPicPr>
@@ -10036,7 +10592,7 @@
                       <p:nvPr/>
                     </p:nvPicPr>
                     <p:blipFill>
-                      <a:blip r:embed="rId4"/>
+                      <a:blip r:embed="rId5"/>
                       <a:stretch>
                         <a:fillRect/>
                       </a:stretch>
@@ -10079,12 +10635,12 @@
           <a:graphicData uri="http://schemas.openxmlformats.org/presentationml/2006/ole">
             <mc:AlternateContent xmlns:mc="http://schemas.openxmlformats.org/markup-compatibility/2006">
               <mc:Choice xmlns:v="urn:schemas-microsoft-com:vml" Requires="v">
-                <p:oleObj spid="_x0000_s2190" name="Feuille de calcul" r:id="rId5" imgW="485649" imgH="485911" progId="Excel.Sheet.12">
+                <p:oleObj spid="_x0000_s2242" name="Feuille de calcul" r:id="rId6" imgW="485649" imgH="485911" progId="Excel.Sheet.12">
                   <p:embed/>
                 </p:oleObj>
               </mc:Choice>
               <mc:Fallback>
-                <p:oleObj name="Feuille de calcul" r:id="rId5" imgW="485649" imgH="485911" progId="Excel.Sheet.12">
+                <p:oleObj name="Feuille de calcul" r:id="rId6" imgW="485649" imgH="485911" progId="Excel.Sheet.12">
                   <p:embed/>
                   <p:pic>
                     <p:nvPicPr>
@@ -10093,7 +10649,7 @@
                       <p:nvPr/>
                     </p:nvPicPr>
                     <p:blipFill>
-                      <a:blip r:embed="rId6"/>
+                      <a:blip r:embed="rId7"/>
                       <a:stretch>
                         <a:fillRect/>
                       </a:stretch>
@@ -10166,12 +10722,12 @@
           <a:graphicData uri="http://schemas.openxmlformats.org/presentationml/2006/ole">
             <mc:AlternateContent xmlns:mc="http://schemas.openxmlformats.org/markup-compatibility/2006">
               <mc:Choice xmlns:v="urn:schemas-microsoft-com:vml" Requires="v">
-                <p:oleObj spid="_x0000_s2191" name="Feuille de calcul" r:id="rId7" imgW="485649" imgH="485911" progId="Excel.Sheet.12">
+                <p:oleObj spid="_x0000_s2243" name="Feuille de calcul" r:id="rId8" imgW="485649" imgH="485911" progId="Excel.Sheet.12">
                   <p:embed/>
                 </p:oleObj>
               </mc:Choice>
               <mc:Fallback>
-                <p:oleObj name="Feuille de calcul" r:id="rId7" imgW="485649" imgH="485911" progId="Excel.Sheet.12">
+                <p:oleObj name="Feuille de calcul" r:id="rId8" imgW="485649" imgH="485911" progId="Excel.Sheet.12">
                   <p:embed/>
                   <p:pic>
                     <p:nvPicPr>
@@ -10180,7 +10736,7 @@
                       <p:nvPr/>
                     </p:nvPicPr>
                     <p:blipFill>
-                      <a:blip r:embed="rId8"/>
+                      <a:blip r:embed="rId9"/>
                       <a:stretch>
                         <a:fillRect/>
                       </a:stretch>
@@ -10253,12 +10809,12 @@
           <a:graphicData uri="http://schemas.openxmlformats.org/presentationml/2006/ole">
             <mc:AlternateContent xmlns:mc="http://schemas.openxmlformats.org/markup-compatibility/2006">
               <mc:Choice xmlns:v="urn:schemas-microsoft-com:vml" Requires="v">
-                <p:oleObj spid="_x0000_s2192" name="Feuille de calcul" r:id="rId9" imgW="485649" imgH="485911" progId="Excel.Sheet.12">
+                <p:oleObj spid="_x0000_s2244" name="Feuille de calcul" r:id="rId10" imgW="485649" imgH="485911" progId="Excel.Sheet.12">
                   <p:embed/>
                 </p:oleObj>
               </mc:Choice>
               <mc:Fallback>
-                <p:oleObj name="Feuille de calcul" r:id="rId9" imgW="485649" imgH="485911" progId="Excel.Sheet.12">
+                <p:oleObj name="Feuille de calcul" r:id="rId10" imgW="485649" imgH="485911" progId="Excel.Sheet.12">
                   <p:embed/>
                   <p:pic>
                     <p:nvPicPr>
@@ -10267,7 +10823,7 @@
                       <p:nvPr/>
                     </p:nvPicPr>
                     <p:blipFill>
-                      <a:blip r:embed="rId10"/>
+                      <a:blip r:embed="rId11"/>
                       <a:stretch>
                         <a:fillRect/>
                       </a:stretch>
@@ -10380,11 +10936,7 @@
             <a:pPr algn="l"/>
             <a:r>
               <a:rPr lang="fr-FR" dirty="0" smtClean="0"/>
-              <a:t>IV. </a:t>
-            </a:r>
-            <a:r>
-              <a:rPr lang="fr-FR" dirty="0" smtClean="0"/>
-              <a:t>Expériences et résultats</a:t>
+              <a:t>IV. Expériences et résultats</a:t>
             </a:r>
             <a:endParaRPr lang="fr-FR" dirty="0"/>
           </a:p>
@@ -10545,7 +11097,6 @@
               <a:rPr lang="fr-FR" sz="2200" dirty="0" smtClean="0"/>
               <a:t>par RàPC avant de segmenter les autres organes</a:t>
             </a:r>
-            <a:endParaRPr lang="fr-FR" sz="2200" dirty="0" smtClean="0"/>
           </a:p>
         </p:txBody>
       </p:sp>
@@ -10611,11 +11162,7 @@
             <a:pPr algn="l"/>
             <a:r>
               <a:rPr lang="fr-FR" dirty="0" smtClean="0"/>
-              <a:t>IV. </a:t>
-            </a:r>
-            <a:r>
-              <a:rPr lang="fr-FR" dirty="0" smtClean="0"/>
-              <a:t>Expériences et résultats</a:t>
+              <a:t>IV. Expériences et résultats</a:t>
             </a:r>
             <a:endParaRPr lang="fr-FR" dirty="0"/>
           </a:p>
@@ -10929,52 +11476,12 @@
             <a:fld id="{D57F1E4F-1CFF-5643-939E-217C01CDF565}" type="slidenum">
               <a:rPr lang="en-US" smtClean="0"/>
               <a:pPr/>
-              <a:t>45</a:t>
+              <a:t>16</a:t>
             </a:fld>
             <a:endParaRPr lang="en-US" dirty="0"/>
           </a:p>
         </p:txBody>
       </p:sp>
-      <p:pic>
-        <p:nvPicPr>
-          <p:cNvPr id="6" name="Image 5"/>
-          <p:cNvPicPr>
-            <a:picLocks noChangeAspect="1"/>
-          </p:cNvPicPr>
-          <p:nvPr/>
-        </p:nvPicPr>
-        <p:blipFill>
-          <a:blip r:embed="rId2">
-            <a:extLst>
-              <a:ext uri="{28A0092B-C50C-407E-A947-70E740481C1C}">
-                <a14:useLocalDpi xmlns:a14="http://schemas.microsoft.com/office/drawing/2010/main" val="0"/>
-              </a:ext>
-            </a:extLst>
-          </a:blip>
-          <a:stretch>
-            <a:fillRect/>
-          </a:stretch>
-        </p:blipFill>
-        <p:spPr>
-          <a:xfrm>
-            <a:off x="2768473" y="1281171"/>
-            <a:ext cx="7216014" cy="5225073"/>
-          </a:xfrm>
-          <a:prstGeom prst="rect">
-            <a:avLst/>
-          </a:prstGeom>
-          <a:ln>
-            <a:noFill/>
-          </a:ln>
-          <a:effectLst>
-            <a:outerShdw blurRad="292100" dist="139700" dir="2700000" algn="tl" rotWithShape="0">
-              <a:srgbClr val="333333">
-                <a:alpha val="65000"/>
-              </a:srgbClr>
-            </a:outerShdw>
-          </a:effectLst>
-        </p:spPr>
-      </p:pic>
       <p:sp>
         <p:nvSpPr>
           <p:cNvPr id="7" name="ZoneTexte 6"/>
@@ -11259,6 +11766,198 @@
               </a:solidFill>
               <a:latin typeface="Times New Roman" panose="02020603050405020304" pitchFamily="18" charset="0"/>
               <a:cs typeface="Times New Roman" panose="02020603050405020304" pitchFamily="18" charset="0"/>
+            </a:endParaRPr>
+          </a:p>
+        </p:txBody>
+      </p:sp>
+      <p:pic>
+        <p:nvPicPr>
+          <p:cNvPr id="3" name="Image 2"/>
+          <p:cNvPicPr>
+            <a:picLocks noChangeAspect="1"/>
+          </p:cNvPicPr>
+          <p:nvPr/>
+        </p:nvPicPr>
+        <p:blipFill>
+          <a:blip r:embed="rId3"/>
+          <a:stretch>
+            <a:fillRect/>
+          </a:stretch>
+        </p:blipFill>
+        <p:spPr>
+          <a:xfrm>
+            <a:off x="2915791" y="1445279"/>
+            <a:ext cx="7068091" cy="5103982"/>
+          </a:xfrm>
+          <a:prstGeom prst="rect">
+            <a:avLst/>
+          </a:prstGeom>
+        </p:spPr>
+      </p:pic>
+      <p:sp>
+        <p:nvSpPr>
+          <p:cNvPr id="15" name="ZoneTexte 14"/>
+          <p:cNvSpPr txBox="1"/>
+          <p:nvPr/>
+        </p:nvSpPr>
+        <p:spPr>
+          <a:xfrm>
+            <a:off x="6012069" y="1658488"/>
+            <a:ext cx="519296" cy="369332"/>
+          </a:xfrm>
+          <a:prstGeom prst="rect">
+            <a:avLst/>
+          </a:prstGeom>
+          <a:noFill/>
+        </p:spPr>
+        <p:txBody>
+          <a:bodyPr wrap="square" rtlCol="0">
+            <a:spAutoFit/>
+          </a:bodyPr>
+          <a:lstStyle/>
+          <a:p>
+            <a:r>
+              <a:rPr lang="fr-FR" dirty="0" smtClean="0">
+                <a:solidFill>
+                  <a:schemeClr val="bg1"/>
+                </a:solidFill>
+                <a:latin typeface="Arial" panose="020B0604020202020204" pitchFamily="34" charset="0"/>
+                <a:cs typeface="Arial" panose="020B0604020202020204" pitchFamily="34" charset="0"/>
+              </a:rPr>
+              <a:t>1</a:t>
+            </a:r>
+            <a:endParaRPr lang="fr-FR" dirty="0">
+              <a:solidFill>
+                <a:schemeClr val="bg1"/>
+              </a:solidFill>
+              <a:latin typeface="Arial" panose="020B0604020202020204" pitchFamily="34" charset="0"/>
+              <a:cs typeface="Arial" panose="020B0604020202020204" pitchFamily="34" charset="0"/>
+            </a:endParaRPr>
+          </a:p>
+        </p:txBody>
+      </p:sp>
+      <p:sp>
+        <p:nvSpPr>
+          <p:cNvPr id="16" name="ZoneTexte 15"/>
+          <p:cNvSpPr txBox="1"/>
+          <p:nvPr/>
+        </p:nvSpPr>
+        <p:spPr>
+          <a:xfrm>
+            <a:off x="9510541" y="1653149"/>
+            <a:ext cx="519296" cy="369332"/>
+          </a:xfrm>
+          <a:prstGeom prst="rect">
+            <a:avLst/>
+          </a:prstGeom>
+          <a:noFill/>
+        </p:spPr>
+        <p:txBody>
+          <a:bodyPr wrap="square" rtlCol="0">
+            <a:spAutoFit/>
+          </a:bodyPr>
+          <a:lstStyle/>
+          <a:p>
+            <a:r>
+              <a:rPr lang="fr-FR" dirty="0" smtClean="0">
+                <a:solidFill>
+                  <a:schemeClr val="bg1"/>
+                </a:solidFill>
+                <a:latin typeface="Arial" panose="020B0604020202020204" pitchFamily="34" charset="0"/>
+                <a:cs typeface="Arial" panose="020B0604020202020204" pitchFamily="34" charset="0"/>
+              </a:rPr>
+              <a:t>2</a:t>
+            </a:r>
+            <a:endParaRPr lang="fr-FR" dirty="0">
+              <a:solidFill>
+                <a:schemeClr val="bg1"/>
+              </a:solidFill>
+              <a:latin typeface="Arial" panose="020B0604020202020204" pitchFamily="34" charset="0"/>
+              <a:cs typeface="Arial" panose="020B0604020202020204" pitchFamily="34" charset="0"/>
+            </a:endParaRPr>
+          </a:p>
+        </p:txBody>
+      </p:sp>
+      <p:sp>
+        <p:nvSpPr>
+          <p:cNvPr id="17" name="ZoneTexte 16"/>
+          <p:cNvSpPr txBox="1"/>
+          <p:nvPr/>
+        </p:nvSpPr>
+        <p:spPr>
+          <a:xfrm>
+            <a:off x="6050324" y="4240689"/>
+            <a:ext cx="519296" cy="369332"/>
+          </a:xfrm>
+          <a:prstGeom prst="rect">
+            <a:avLst/>
+          </a:prstGeom>
+          <a:noFill/>
+        </p:spPr>
+        <p:txBody>
+          <a:bodyPr wrap="square" rtlCol="0">
+            <a:spAutoFit/>
+          </a:bodyPr>
+          <a:lstStyle/>
+          <a:p>
+            <a:r>
+              <a:rPr lang="fr-FR" dirty="0">
+                <a:solidFill>
+                  <a:schemeClr val="bg1"/>
+                </a:solidFill>
+                <a:latin typeface="Arial" panose="020B0604020202020204" pitchFamily="34" charset="0"/>
+                <a:cs typeface="Arial" panose="020B0604020202020204" pitchFamily="34" charset="0"/>
+              </a:rPr>
+              <a:t>3</a:t>
+            </a:r>
+            <a:endParaRPr lang="fr-FR" dirty="0">
+              <a:solidFill>
+                <a:schemeClr val="bg1"/>
+              </a:solidFill>
+              <a:latin typeface="Arial" panose="020B0604020202020204" pitchFamily="34" charset="0"/>
+              <a:cs typeface="Arial" panose="020B0604020202020204" pitchFamily="34" charset="0"/>
+            </a:endParaRPr>
+          </a:p>
+        </p:txBody>
+      </p:sp>
+      <p:sp>
+        <p:nvSpPr>
+          <p:cNvPr id="18" name="ZoneTexte 17"/>
+          <p:cNvSpPr txBox="1"/>
+          <p:nvPr/>
+        </p:nvSpPr>
+        <p:spPr>
+          <a:xfrm>
+            <a:off x="9510541" y="4240689"/>
+            <a:ext cx="519296" cy="369332"/>
+          </a:xfrm>
+          <a:prstGeom prst="rect">
+            <a:avLst/>
+          </a:prstGeom>
+          <a:noFill/>
+        </p:spPr>
+        <p:txBody>
+          <a:bodyPr wrap="square" rtlCol="0">
+            <a:spAutoFit/>
+          </a:bodyPr>
+          <a:lstStyle/>
+          <a:p>
+            <a:r>
+              <a:rPr lang="fr-FR" dirty="0" smtClean="0">
+                <a:solidFill>
+                  <a:schemeClr val="bg1"/>
+                </a:solidFill>
+                <a:latin typeface="Arial" panose="020B0604020202020204" pitchFamily="34" charset="0"/>
+                <a:cs typeface="Arial" panose="020B0604020202020204" pitchFamily="34" charset="0"/>
+              </a:rPr>
+              <a:t>4</a:t>
+            </a:r>
+            <a:endParaRPr lang="fr-FR" dirty="0">
+              <a:solidFill>
+                <a:schemeClr val="bg1"/>
+              </a:solidFill>
+              <a:latin typeface="Arial" panose="020B0604020202020204" pitchFamily="34" charset="0"/>
+              <a:cs typeface="Arial" panose="020B0604020202020204" pitchFamily="34" charset="0"/>
             </a:endParaRPr>
           </a:p>
         </p:txBody>
@@ -11325,11 +12024,7 @@
             <a:pPr algn="l"/>
             <a:r>
               <a:rPr lang="fr-FR" dirty="0" smtClean="0"/>
-              <a:t>IV. </a:t>
-            </a:r>
-            <a:r>
-              <a:rPr lang="fr-FR" dirty="0" smtClean="0"/>
-              <a:t>Expériences et résultats</a:t>
+              <a:t>IV. Expériences et résultats</a:t>
             </a:r>
             <a:endParaRPr lang="fr-FR" dirty="0"/>
           </a:p>
@@ -11360,17 +12055,8 @@
             </a:pPr>
             <a:r>
               <a:rPr lang="fr-FR" dirty="0" smtClean="0"/>
-              <a:t>Mesure </a:t>
-            </a:r>
-            <a:r>
-              <a:rPr lang="fr-FR" dirty="0" smtClean="0"/>
-              <a:t>de </a:t>
-            </a:r>
-            <a:r>
-              <a:rPr lang="fr-FR" dirty="0" smtClean="0"/>
-              <a:t>similarité d’un nouveau cas par rapport à la base </a:t>
-            </a:r>
-            <a:endParaRPr lang="fr-FR" dirty="0" smtClean="0"/>
+              <a:t>Mesure de similarité d’un nouveau cas par rapport à la base </a:t>
+            </a:r>
           </a:p>
         </p:txBody>
       </p:sp>
@@ -12428,11 +13114,7 @@
             <a:pPr algn="l"/>
             <a:r>
               <a:rPr lang="fr-FR" dirty="0" smtClean="0"/>
-              <a:t>IV. </a:t>
-            </a:r>
-            <a:r>
-              <a:rPr lang="fr-FR" dirty="0" smtClean="0"/>
-              <a:t>Résultats actuels</a:t>
+              <a:t>IV. Résultats actuels</a:t>
             </a:r>
             <a:endParaRPr lang="fr-FR" dirty="0"/>
           </a:p>
@@ -12465,7 +13147,6 @@
               <a:rPr lang="fr-FR" dirty="0" smtClean="0"/>
               <a:t>Résultat global (avec adaptation de la position des germes) </a:t>
             </a:r>
-            <a:endParaRPr lang="fr-FR" dirty="0" smtClean="0"/>
           </a:p>
         </p:txBody>
       </p:sp>
@@ -12478,7 +13159,7 @@
           <p:nvPr/>
         </p:nvPicPr>
         <p:blipFill>
-          <a:blip r:embed="rId2">
+          <a:blip r:embed="rId3">
             <a:extLst>
               <a:ext uri="{28A0092B-C50C-407E-A947-70E740481C1C}">
                 <a14:useLocalDpi xmlns:a14="http://schemas.microsoft.com/office/drawing/2010/main" val="0"/>
@@ -12508,7 +13189,7 @@
           <p:nvPr/>
         </p:nvPicPr>
         <p:blipFill>
-          <a:blip r:embed="rId3">
+          <a:blip r:embed="rId4">
             <a:extLst>
               <a:ext uri="{28A0092B-C50C-407E-A947-70E740481C1C}">
                 <a14:useLocalDpi xmlns:a14="http://schemas.microsoft.com/office/drawing/2010/main" val="0"/>
@@ -12538,7 +13219,7 @@
           <p:nvPr/>
         </p:nvPicPr>
         <p:blipFill>
-          <a:blip r:embed="rId4">
+          <a:blip r:embed="rId5">
             <a:extLst>
               <a:ext uri="{28A0092B-C50C-407E-A947-70E740481C1C}">
                 <a14:useLocalDpi xmlns:a14="http://schemas.microsoft.com/office/drawing/2010/main" val="0"/>
@@ -12636,7 +13317,7 @@
           <p:nvPr/>
         </p:nvPicPr>
         <p:blipFill>
-          <a:blip r:embed="rId5"/>
+          <a:blip r:embed="rId6"/>
           <a:stretch>
             <a:fillRect/>
           </a:stretch>
@@ -12660,7 +13341,7 @@
           <p:nvPr/>
         </p:nvPicPr>
         <p:blipFill>
-          <a:blip r:embed="rId6">
+          <a:blip r:embed="rId7">
             <a:extLst>
               <a:ext uri="{28A0092B-C50C-407E-A947-70E740481C1C}">
                 <a14:useLocalDpi xmlns:a14="http://schemas.microsoft.com/office/drawing/2010/main" val="0"/>
@@ -12806,8 +13487,8 @@
         </p:nvSpPr>
         <p:spPr>
           <a:xfrm>
-            <a:off x="1484310" y="312313"/>
-            <a:ext cx="10018713" cy="1327301"/>
+            <a:off x="1484309" y="121023"/>
+            <a:ext cx="10018713" cy="779929"/>
           </a:xfrm>
         </p:spPr>
         <p:txBody>
@@ -12819,15 +13500,8 @@
             <a:pPr algn="l"/>
             <a:r>
               <a:rPr lang="fr-FR" dirty="0" smtClean="0"/>
-              <a:t>Bibliographie RàPC</a:t>
-            </a:r>
-            <a:r>
-              <a:rPr lang="fr-FR" dirty="0" smtClean="0"/>
-              <a:t/>
-            </a:r>
-            <a:br>
-              <a:rPr lang="fr-FR" dirty="0" smtClean="0"/>
-            </a:br>
+              <a:t>Conclusion</a:t>
+            </a:r>
             <a:endParaRPr lang="fr-FR" dirty="0"/>
           </a:p>
         </p:txBody>
@@ -12844,318 +13518,83 @@
         </p:nvSpPr>
         <p:spPr>
           <a:xfrm>
-            <a:off x="1484310" y="1150883"/>
-            <a:ext cx="10577061" cy="5496102"/>
+            <a:off x="1484310" y="1048871"/>
+            <a:ext cx="10018713" cy="5029200"/>
           </a:xfrm>
         </p:spPr>
         <p:txBody>
-          <a:bodyPr anchor="t">
-            <a:normAutofit/>
-          </a:bodyPr>
-          <a:lstStyle/>
-          <a:p>
-            <a:pPr lvl="1"/>
-            <a:r>
-              <a:rPr lang="en-US" dirty="0" smtClean="0"/>
-              <a:t>[</a:t>
-            </a:r>
-            <a:r>
-              <a:rPr lang="en-US" dirty="0" smtClean="0"/>
-              <a:t>Finnie] “Similarity </a:t>
-            </a:r>
-            <a:r>
-              <a:rPr lang="en-US" dirty="0"/>
-              <a:t>and Metrics in Case-Based </a:t>
-            </a:r>
-            <a:r>
-              <a:rPr lang="en-US" dirty="0" smtClean="0"/>
-              <a:t>Reasoning” </a:t>
-            </a:r>
-            <a:r>
-              <a:rPr lang="en-US" dirty="0" err="1" smtClean="0"/>
-              <a:t>Finnnie</a:t>
-            </a:r>
-            <a:r>
-              <a:rPr lang="en-US" dirty="0" smtClean="0"/>
-              <a:t>  &amp; Sun 2002</a:t>
-            </a:r>
-          </a:p>
-          <a:p>
-            <a:pPr lvl="1"/>
-            <a:r>
-              <a:rPr lang="en-US" dirty="0" smtClean="0"/>
-              <a:t>[</a:t>
-            </a:r>
-            <a:r>
-              <a:rPr lang="en-US" dirty="0" err="1" smtClean="0"/>
-              <a:t>Perner</a:t>
-            </a:r>
-            <a:r>
-              <a:rPr lang="en-US" dirty="0" smtClean="0"/>
-              <a:t>] “An </a:t>
-            </a:r>
-            <a:r>
-              <a:rPr lang="en-US" dirty="0"/>
-              <a:t>architecture for a CBR image segmentation </a:t>
-            </a:r>
-            <a:r>
-              <a:rPr lang="en-US" dirty="0" smtClean="0"/>
-              <a:t>system” </a:t>
-            </a:r>
-            <a:r>
-              <a:rPr lang="en-US" dirty="0" err="1" smtClean="0"/>
-              <a:t>Perner</a:t>
-            </a:r>
-            <a:r>
-              <a:rPr lang="en-US" dirty="0" smtClean="0"/>
-              <a:t> 1999</a:t>
-            </a:r>
-          </a:p>
-          <a:p>
-            <a:pPr lvl="1"/>
-            <a:r>
-              <a:rPr lang="en-US" dirty="0" smtClean="0"/>
-              <a:t>[</a:t>
-            </a:r>
-            <a:r>
-              <a:rPr lang="en-US" dirty="0" err="1" smtClean="0"/>
-              <a:t>Burkhard</a:t>
-            </a:r>
-            <a:r>
-              <a:rPr lang="en-US" dirty="0" smtClean="0"/>
-              <a:t>] “Case </a:t>
-            </a:r>
-            <a:r>
-              <a:rPr lang="en-US" dirty="0"/>
-              <a:t>Completion and Similarity in Case-Based </a:t>
-            </a:r>
-            <a:r>
-              <a:rPr lang="en-US" dirty="0" smtClean="0"/>
-              <a:t>Reasoning” </a:t>
-            </a:r>
-            <a:r>
-              <a:rPr lang="en-US" dirty="0" err="1" smtClean="0"/>
-              <a:t>Burkhard</a:t>
-            </a:r>
-            <a:r>
-              <a:rPr lang="en-US" dirty="0" smtClean="0"/>
-              <a:t> 2004</a:t>
-            </a:r>
-          </a:p>
-          <a:p>
-            <a:pPr lvl="1"/>
-            <a:r>
-              <a:rPr lang="en-US" dirty="0" smtClean="0"/>
-              <a:t>[</a:t>
-            </a:r>
-            <a:r>
-              <a:rPr lang="en-US" dirty="0" err="1" smtClean="0"/>
-              <a:t>Garrell</a:t>
-            </a:r>
-            <a:r>
-              <a:rPr lang="en-US" dirty="0" smtClean="0"/>
-              <a:t>] “Automatic </a:t>
-            </a:r>
-            <a:r>
-              <a:rPr lang="en-US" dirty="0"/>
-              <a:t>diagnosis with genetic algorithms and case-based </a:t>
-            </a:r>
-            <a:r>
-              <a:rPr lang="en-US" dirty="0" smtClean="0"/>
-              <a:t>reasoning” </a:t>
-            </a:r>
-            <a:r>
-              <a:rPr lang="en-US" dirty="0" err="1" smtClean="0"/>
-              <a:t>Garrell</a:t>
-            </a:r>
-            <a:r>
-              <a:rPr lang="en-US" dirty="0" smtClean="0"/>
-              <a:t> &amp; al. 1999</a:t>
-            </a:r>
-          </a:p>
-          <a:p>
-            <a:pPr lvl="1"/>
-            <a:r>
-              <a:rPr lang="en-US" dirty="0" smtClean="0"/>
-              <a:t>[</a:t>
-            </a:r>
-            <a:r>
-              <a:rPr lang="en-US" dirty="0" err="1" smtClean="0"/>
-              <a:t>Golobardes</a:t>
-            </a:r>
-            <a:r>
-              <a:rPr lang="en-US" dirty="0" smtClean="0"/>
-              <a:t>] “Computer </a:t>
-            </a:r>
-            <a:r>
-              <a:rPr lang="en-US" dirty="0"/>
-              <a:t>aided diagnosis with case-based reasoning and genetic </a:t>
-            </a:r>
-            <a:r>
-              <a:rPr lang="en-US" dirty="0" smtClean="0"/>
-              <a:t>algorithms” </a:t>
-            </a:r>
-            <a:r>
-              <a:rPr lang="en-US" dirty="0" err="1" smtClean="0"/>
-              <a:t>Golobardes</a:t>
-            </a:r>
-            <a:r>
-              <a:rPr lang="en-US" dirty="0" smtClean="0"/>
-              <a:t> &amp; al. </a:t>
-            </a:r>
-            <a:r>
-              <a:rPr lang="en-US" dirty="0" smtClean="0"/>
-              <a:t>2002</a:t>
-            </a:r>
-          </a:p>
-          <a:p>
-            <a:pPr lvl="1"/>
-            <a:r>
-              <a:rPr lang="en-US" dirty="0" smtClean="0"/>
-              <a:t>[Wang] </a:t>
-            </a:r>
-            <a:r>
-              <a:rPr lang="en-US" dirty="0"/>
-              <a:t>“Image Quality Assessment: From Error Visibility to Structural </a:t>
-            </a:r>
-            <a:r>
-              <a:rPr lang="en-US" dirty="0" smtClean="0"/>
-              <a:t>Similarity” </a:t>
-            </a:r>
+          <a:bodyPr anchor="t"/>
+          <a:lstStyle/>
+          <a:p>
+            <a:pPr>
+              <a:buFontTx/>
+              <a:buChar char="-"/>
+            </a:pPr>
             <a:r>
               <a:rPr lang="fr-FR" dirty="0" smtClean="0"/>
-              <a:t>Wang &amp; al. 2004</a:t>
-            </a:r>
-          </a:p>
-          <a:p>
-            <a:pPr lvl="1"/>
-            <a:r>
-              <a:rPr lang="en-US" dirty="0" smtClean="0"/>
-              <a:t>[</a:t>
-            </a:r>
-            <a:r>
-              <a:rPr lang="en-US" dirty="0" err="1" smtClean="0"/>
-              <a:t>Hudelot</a:t>
-            </a:r>
-            <a:r>
-              <a:rPr lang="en-US" dirty="0" smtClean="0"/>
-              <a:t>] “Fuzzy </a:t>
-            </a:r>
-            <a:r>
-              <a:rPr lang="en-US" dirty="0"/>
-              <a:t>spatial relation ontology for image </a:t>
-            </a:r>
-            <a:r>
-              <a:rPr lang="en-US" dirty="0" smtClean="0"/>
-              <a:t>interpretation” </a:t>
-            </a:r>
-            <a:r>
-              <a:rPr lang="en-US" dirty="0" err="1" smtClean="0"/>
-              <a:t>Hudelot</a:t>
-            </a:r>
-            <a:r>
-              <a:rPr lang="en-US" dirty="0"/>
-              <a:t>, </a:t>
-            </a:r>
-            <a:r>
-              <a:rPr lang="en-US" dirty="0" err="1" smtClean="0"/>
-              <a:t>Atif</a:t>
-            </a:r>
-            <a:r>
-              <a:rPr lang="en-US" dirty="0" smtClean="0"/>
-              <a:t> &amp; Bloch</a:t>
-            </a:r>
-            <a:r>
-              <a:rPr lang="en-US" dirty="0"/>
-              <a:t>, 2008</a:t>
-            </a:r>
-          </a:p>
-          <a:p>
-            <a:pPr lvl="1"/>
-            <a:r>
-              <a:rPr lang="en-US" dirty="0" smtClean="0"/>
-              <a:t>[</a:t>
-            </a:r>
-            <a:r>
-              <a:rPr lang="en-US" dirty="0" err="1" smtClean="0"/>
-              <a:t>Colliot</a:t>
-            </a:r>
-            <a:r>
-              <a:rPr lang="en-US" dirty="0" smtClean="0"/>
-              <a:t>] “Integration </a:t>
-            </a:r>
-            <a:r>
-              <a:rPr lang="en-US" dirty="0"/>
-              <a:t>of fuzzy spatial relations in deformable models—Application to brain MRI </a:t>
-            </a:r>
-            <a:r>
-              <a:rPr lang="en-US" dirty="0" smtClean="0"/>
-              <a:t>segmentation” </a:t>
-            </a:r>
-            <a:r>
-              <a:rPr lang="en-US" dirty="0" err="1" smtClean="0"/>
-              <a:t>Colliot</a:t>
-            </a:r>
-            <a:r>
-              <a:rPr lang="en-US" dirty="0" smtClean="0"/>
-              <a:t> &amp; </a:t>
-            </a:r>
-            <a:r>
-              <a:rPr lang="en-US" dirty="0" err="1" smtClean="0"/>
-              <a:t>Camara</a:t>
-            </a:r>
-            <a:r>
-              <a:rPr lang="en-US" dirty="0"/>
-              <a:t>, Isabelle Bloch, </a:t>
-            </a:r>
-            <a:r>
-              <a:rPr lang="en-US" dirty="0" smtClean="0"/>
-              <a:t>2006</a:t>
-            </a:r>
-            <a:endParaRPr lang="en-US" dirty="0"/>
-          </a:p>
-          <a:p>
-            <a:pPr lvl="1"/>
-            <a:endParaRPr lang="en-US" dirty="0" smtClean="0"/>
-          </a:p>
-          <a:p>
-            <a:pPr lvl="1"/>
-            <a:endParaRPr lang="en-US" sz="2400" dirty="0"/>
-          </a:p>
-          <a:p>
-            <a:pPr lvl="1"/>
-            <a:endParaRPr lang="fr-FR" sz="2200" dirty="0" smtClean="0"/>
-          </a:p>
-        </p:txBody>
-      </p:sp>
-      <p:sp>
-        <p:nvSpPr>
-          <p:cNvPr id="5" name="Espace réservé du numéro de diapositive 4"/>
-          <p:cNvSpPr>
-            <a:spLocks noGrp="1"/>
-          </p:cNvSpPr>
-          <p:nvPr>
-            <p:ph type="sldNum" sz="quarter" idx="12"/>
-          </p:nvPr>
-        </p:nvSpPr>
-        <p:spPr/>
-        <p:txBody>
-          <a:bodyPr/>
-          <a:lstStyle/>
-          <a:p>
-            <a:fld id="{D57F1E4F-1CFF-5643-939E-217C01CDF565}" type="slidenum">
-              <a:rPr lang="en-US" smtClean="0"/>
-              <a:pPr/>
-              <a:t>19</a:t>
-            </a:fld>
-            <a:endParaRPr lang="en-US" dirty="0"/>
+              <a:t>Le RàPC couplé à d’autres outils donne des résultats encourageants  </a:t>
+            </a:r>
+          </a:p>
+          <a:p>
+            <a:pPr>
+              <a:buFontTx/>
+              <a:buChar char="-"/>
+            </a:pPr>
+            <a:r>
+              <a:rPr lang="fr-FR" dirty="0" smtClean="0"/>
+              <a:t>La logique floue permet d’évaluer la position des organes les uns par rapport aux autres</a:t>
+            </a:r>
+          </a:p>
+          <a:p>
+            <a:pPr>
+              <a:buFontTx/>
+              <a:buChar char="-"/>
+            </a:pPr>
+            <a:r>
+              <a:rPr lang="fr-FR" dirty="0" smtClean="0"/>
+              <a:t>La suppression des muscles par segmentation résout le problème de fuite de la tumeur</a:t>
+            </a:r>
+          </a:p>
+          <a:p>
+            <a:pPr>
+              <a:buFontTx/>
+              <a:buChar char="-"/>
+            </a:pPr>
+            <a:r>
+              <a:rPr lang="fr-FR" dirty="0" smtClean="0"/>
+              <a:t>Des post-traitements sont nécessaires pour homogénéiser les objets segmentés</a:t>
+            </a:r>
+          </a:p>
+          <a:p>
+            <a:pPr>
+              <a:buFontTx/>
+              <a:buChar char="-"/>
+            </a:pPr>
+            <a:r>
+              <a:rPr lang="fr-FR" dirty="0" smtClean="0"/>
+              <a:t>La phase d’adaptation est à améliorer pour parer à tous les problèmes potentiels (déplacement d’organes, changement de couleur, etc.)</a:t>
+            </a:r>
+          </a:p>
+          <a:p>
+            <a:pPr>
+              <a:buFontTx/>
+              <a:buChar char="-"/>
+            </a:pPr>
+            <a:endParaRPr lang="fr-FR" dirty="0" smtClean="0"/>
+          </a:p>
+          <a:p>
+            <a:pPr>
+              <a:buFontTx/>
+              <a:buChar char="-"/>
+            </a:pPr>
+            <a:endParaRPr lang="fr-FR" dirty="0" smtClean="0"/>
           </a:p>
         </p:txBody>
       </p:sp>
     </p:spTree>
     <p:extLst>
       <p:ext uri="{BB962C8B-B14F-4D97-AF65-F5344CB8AC3E}">
-        <p14:creationId xmlns:p14="http://schemas.microsoft.com/office/powerpoint/2010/main" val="1610450143"/>
+        <p14:creationId xmlns:p14="http://schemas.microsoft.com/office/powerpoint/2010/main" val="1660539177"/>
       </p:ext>
     </p:extLst>
   </p:cSld>
@@ -13248,11 +13687,7 @@
             </a:pPr>
             <a:r>
               <a:rPr lang="fr-FR" dirty="0" smtClean="0"/>
-              <a:t>Rappels </a:t>
-            </a:r>
-            <a:r>
-              <a:rPr lang="fr-FR" dirty="0" smtClean="0"/>
-              <a:t>sur </a:t>
+              <a:t>Rappels sur </a:t>
             </a:r>
             <a:r>
               <a:rPr lang="fr-FR" dirty="0"/>
@@ -13260,11 +13695,7 @@
             </a:r>
             <a:r>
               <a:rPr lang="fr-FR" dirty="0" smtClean="0"/>
-              <a:t>régions / </a:t>
-            </a:r>
-            <a:r>
-              <a:rPr lang="fr-FR" dirty="0" smtClean="0"/>
-              <a:t>le RàPC </a:t>
+              <a:t>régions / le RàPC </a:t>
             </a:r>
           </a:p>
           <a:p>
@@ -13276,15 +13707,11 @@
             </a:pPr>
             <a:r>
               <a:rPr lang="fr-FR" dirty="0"/>
-              <a:t>Mesure de similarité entre cas Suppression </a:t>
+              <a:t>Mesure de similarité entre </a:t>
             </a:r>
             <a:r>
               <a:rPr lang="fr-FR" dirty="0" smtClean="0"/>
-              <a:t>des </a:t>
-            </a:r>
-            <a:r>
-              <a:rPr lang="fr-FR" dirty="0" smtClean="0"/>
-              <a:t>muscles</a:t>
+              <a:t>cas</a:t>
             </a:r>
           </a:p>
           <a:p>
@@ -13306,9 +13733,12 @@
             </a:pPr>
             <a:r>
               <a:rPr lang="fr-FR" dirty="0" smtClean="0"/>
-              <a:t>Positionnement des organes</a:t>
-            </a:r>
-            <a:endParaRPr lang="fr-FR" dirty="0" smtClean="0"/>
+              <a:t>Positionnement </a:t>
+            </a:r>
+            <a:r>
+              <a:rPr lang="fr-FR" dirty="0" smtClean="0"/>
+              <a:t>des organes</a:t>
+            </a:r>
           </a:p>
           <a:p>
             <a:pPr marL="514350" indent="-514350">
@@ -13333,7 +13763,6 @@
               <a:rPr lang="fr-FR" dirty="0" smtClean="0"/>
               <a:t>Expériences et résultats</a:t>
             </a:r>
-            <a:endParaRPr lang="fr-FR" dirty="0" smtClean="0"/>
           </a:p>
           <a:p>
             <a:pPr marL="0" indent="0">
@@ -13347,6 +13776,389 @@
     <p:extLst>
       <p:ext uri="{BB962C8B-B14F-4D97-AF65-F5344CB8AC3E}">
         <p14:creationId xmlns:p14="http://schemas.microsoft.com/office/powerpoint/2010/main" val="2689387102"/>
+      </p:ext>
+    </p:extLst>
+  </p:cSld>
+  <p:clrMapOvr>
+    <a:masterClrMapping/>
+  </p:clrMapOvr>
+  <p:timing>
+    <p:tnLst>
+      <p:par>
+        <p:cTn id="1" dur="indefinite" restart="never" nodeType="tmRoot"/>
+      </p:par>
+    </p:tnLst>
+  </p:timing>
+</p:sld>
+</file>
+
+<file path=ppt/slides/slide20.xml><?xml version="1.0" encoding="utf-8"?>
+<p:sld xmlns:a="http://schemas.openxmlformats.org/drawingml/2006/main" xmlns:r="http://schemas.openxmlformats.org/officeDocument/2006/relationships" xmlns:p="http://schemas.openxmlformats.org/presentationml/2006/main">
+  <p:cSld>
+    <p:spTree>
+      <p:nvGrpSpPr>
+        <p:cNvPr id="1" name=""/>
+        <p:cNvGrpSpPr/>
+        <p:nvPr/>
+      </p:nvGrpSpPr>
+      <p:grpSpPr>
+        <a:xfrm>
+          <a:off x="0" y="0"/>
+          <a:ext cx="0" cy="0"/>
+          <a:chOff x="0" y="0"/>
+          <a:chExt cx="0" cy="0"/>
+        </a:xfrm>
+      </p:grpSpPr>
+      <p:sp>
+        <p:nvSpPr>
+          <p:cNvPr id="2" name="Titre 1"/>
+          <p:cNvSpPr>
+            <a:spLocks noGrp="1"/>
+          </p:cNvSpPr>
+          <p:nvPr>
+            <p:ph type="title"/>
+          </p:nvPr>
+        </p:nvSpPr>
+        <p:spPr>
+          <a:xfrm>
+            <a:off x="1484310" y="312313"/>
+            <a:ext cx="10018713" cy="1327301"/>
+          </a:xfrm>
+        </p:spPr>
+        <p:txBody>
+          <a:bodyPr>
+            <a:normAutofit/>
+          </a:bodyPr>
+          <a:lstStyle/>
+          <a:p>
+            <a:pPr algn="l"/>
+            <a:r>
+              <a:rPr lang="fr-FR" dirty="0" smtClean="0"/>
+              <a:t>Bibliographie RàPC</a:t>
+            </a:r>
+            <a:br>
+              <a:rPr lang="fr-FR" dirty="0" smtClean="0"/>
+            </a:br>
+            <a:endParaRPr lang="fr-FR" dirty="0"/>
+          </a:p>
+        </p:txBody>
+      </p:sp>
+      <p:sp>
+        <p:nvSpPr>
+          <p:cNvPr id="3" name="Espace réservé du contenu 2"/>
+          <p:cNvSpPr>
+            <a:spLocks noGrp="1"/>
+          </p:cNvSpPr>
+          <p:nvPr>
+            <p:ph idx="1"/>
+          </p:nvPr>
+        </p:nvSpPr>
+        <p:spPr>
+          <a:xfrm>
+            <a:off x="1484310" y="1150883"/>
+            <a:ext cx="10577061" cy="5496102"/>
+          </a:xfrm>
+        </p:spPr>
+        <p:txBody>
+          <a:bodyPr anchor="t">
+            <a:normAutofit/>
+          </a:bodyPr>
+          <a:lstStyle/>
+          <a:p>
+            <a:pPr lvl="1"/>
+            <a:r>
+              <a:rPr lang="en-US" dirty="0" smtClean="0"/>
+              <a:t>[Finnie] “Similarity </a:t>
+            </a:r>
+            <a:r>
+              <a:rPr lang="en-US" dirty="0"/>
+              <a:t>and Metrics in Case-Based </a:t>
+            </a:r>
+            <a:r>
+              <a:rPr lang="en-US" dirty="0" smtClean="0"/>
+              <a:t>Reasoning” </a:t>
+            </a:r>
+            <a:r>
+              <a:rPr lang="en-US" dirty="0" err="1" smtClean="0"/>
+              <a:t>Finnnie</a:t>
+            </a:r>
+            <a:r>
+              <a:rPr lang="en-US" dirty="0" smtClean="0"/>
+              <a:t>  &amp; Sun 2002</a:t>
+            </a:r>
+          </a:p>
+          <a:p>
+            <a:pPr lvl="1"/>
+            <a:r>
+              <a:rPr lang="en-US" dirty="0" smtClean="0"/>
+              <a:t>[</a:t>
+            </a:r>
+            <a:r>
+              <a:rPr lang="en-US" dirty="0" err="1" smtClean="0"/>
+              <a:t>Perner</a:t>
+            </a:r>
+            <a:r>
+              <a:rPr lang="en-US" dirty="0" smtClean="0"/>
+              <a:t>] “An </a:t>
+            </a:r>
+            <a:r>
+              <a:rPr lang="en-US" dirty="0"/>
+              <a:t>architecture for a CBR image segmentation </a:t>
+            </a:r>
+            <a:r>
+              <a:rPr lang="en-US" dirty="0" smtClean="0"/>
+              <a:t>system” </a:t>
+            </a:r>
+            <a:r>
+              <a:rPr lang="en-US" dirty="0" err="1" smtClean="0"/>
+              <a:t>Perner</a:t>
+            </a:r>
+            <a:r>
+              <a:rPr lang="en-US" dirty="0" smtClean="0"/>
+              <a:t> 1999</a:t>
+            </a:r>
+          </a:p>
+          <a:p>
+            <a:pPr lvl="1"/>
+            <a:r>
+              <a:rPr lang="en-US" dirty="0" smtClean="0"/>
+              <a:t>[</a:t>
+            </a:r>
+            <a:r>
+              <a:rPr lang="en-US" dirty="0" err="1" smtClean="0"/>
+              <a:t>Burkhard</a:t>
+            </a:r>
+            <a:r>
+              <a:rPr lang="en-US" dirty="0" smtClean="0"/>
+              <a:t>] “Case </a:t>
+            </a:r>
+            <a:r>
+              <a:rPr lang="en-US" dirty="0"/>
+              <a:t>Completion and Similarity in Case-Based </a:t>
+            </a:r>
+            <a:r>
+              <a:rPr lang="en-US" dirty="0" smtClean="0"/>
+              <a:t>Reasoning” </a:t>
+            </a:r>
+            <a:r>
+              <a:rPr lang="en-US" dirty="0" err="1" smtClean="0"/>
+              <a:t>Burkhard</a:t>
+            </a:r>
+            <a:r>
+              <a:rPr lang="en-US" dirty="0" smtClean="0"/>
+              <a:t> 2004</a:t>
+            </a:r>
+          </a:p>
+          <a:p>
+            <a:pPr lvl="1"/>
+            <a:r>
+              <a:rPr lang="en-US" dirty="0" smtClean="0"/>
+              <a:t>[</a:t>
+            </a:r>
+            <a:r>
+              <a:rPr lang="en-US" dirty="0" err="1" smtClean="0"/>
+              <a:t>Garrell</a:t>
+            </a:r>
+            <a:r>
+              <a:rPr lang="en-US" dirty="0" smtClean="0"/>
+              <a:t>] “Automatic </a:t>
+            </a:r>
+            <a:r>
+              <a:rPr lang="en-US" dirty="0"/>
+              <a:t>diagnosis with genetic algorithms and case-based </a:t>
+            </a:r>
+            <a:r>
+              <a:rPr lang="en-US" dirty="0" smtClean="0"/>
+              <a:t>reasoning” </a:t>
+            </a:r>
+            <a:r>
+              <a:rPr lang="en-US" dirty="0" err="1" smtClean="0"/>
+              <a:t>Garrell</a:t>
+            </a:r>
+            <a:r>
+              <a:rPr lang="en-US" dirty="0" smtClean="0"/>
+              <a:t> &amp; al. 1999</a:t>
+            </a:r>
+          </a:p>
+          <a:p>
+            <a:pPr lvl="1"/>
+            <a:r>
+              <a:rPr lang="en-US" dirty="0" smtClean="0"/>
+              <a:t>[</a:t>
+            </a:r>
+            <a:r>
+              <a:rPr lang="en-US" dirty="0" err="1" smtClean="0"/>
+              <a:t>Golobardes</a:t>
+            </a:r>
+            <a:r>
+              <a:rPr lang="en-US" dirty="0" smtClean="0"/>
+              <a:t>] “Computer </a:t>
+            </a:r>
+            <a:r>
+              <a:rPr lang="en-US" dirty="0"/>
+              <a:t>aided diagnosis with case-based reasoning and genetic </a:t>
+            </a:r>
+            <a:r>
+              <a:rPr lang="en-US" dirty="0" smtClean="0"/>
+              <a:t>algorithms” </a:t>
+            </a:r>
+            <a:r>
+              <a:rPr lang="en-US" dirty="0" err="1" smtClean="0"/>
+              <a:t>Golobardes</a:t>
+            </a:r>
+            <a:r>
+              <a:rPr lang="en-US" dirty="0" smtClean="0"/>
+              <a:t> &amp; al. 2002</a:t>
+            </a:r>
+          </a:p>
+          <a:p>
+            <a:pPr lvl="1"/>
+            <a:r>
+              <a:rPr lang="en-US" dirty="0" smtClean="0"/>
+              <a:t>[Wang] </a:t>
+            </a:r>
+            <a:r>
+              <a:rPr lang="en-US" dirty="0"/>
+              <a:t>“Image Quality Assessment: From Error Visibility to Structural </a:t>
+            </a:r>
+            <a:r>
+              <a:rPr lang="en-US" dirty="0" smtClean="0"/>
+              <a:t>Similarity” </a:t>
+            </a:r>
+            <a:r>
+              <a:rPr lang="fr-FR" dirty="0" smtClean="0"/>
+              <a:t>Wang &amp; al. 2004</a:t>
+            </a:r>
+          </a:p>
+          <a:p>
+            <a:pPr lvl="1"/>
+            <a:r>
+              <a:rPr lang="en-US" dirty="0" smtClean="0"/>
+              <a:t>[</a:t>
+            </a:r>
+            <a:r>
+              <a:rPr lang="en-US" dirty="0" err="1" smtClean="0"/>
+              <a:t>Hudelot</a:t>
+            </a:r>
+            <a:r>
+              <a:rPr lang="en-US" dirty="0" smtClean="0"/>
+              <a:t>] “Fuzzy </a:t>
+            </a:r>
+            <a:r>
+              <a:rPr lang="en-US" dirty="0"/>
+              <a:t>spatial relation ontology for image </a:t>
+            </a:r>
+            <a:r>
+              <a:rPr lang="en-US" dirty="0" smtClean="0"/>
+              <a:t>interpretation” </a:t>
+            </a:r>
+            <a:r>
+              <a:rPr lang="en-US" dirty="0" err="1" smtClean="0"/>
+              <a:t>Hudelot</a:t>
+            </a:r>
+            <a:r>
+              <a:rPr lang="en-US" dirty="0"/>
+              <a:t>, </a:t>
+            </a:r>
+            <a:r>
+              <a:rPr lang="en-US" dirty="0" err="1" smtClean="0"/>
+              <a:t>Atif</a:t>
+            </a:r>
+            <a:r>
+              <a:rPr lang="en-US" dirty="0" smtClean="0"/>
+              <a:t> &amp; Bloch</a:t>
+            </a:r>
+            <a:r>
+              <a:rPr lang="en-US" dirty="0"/>
+              <a:t>, 2008</a:t>
+            </a:r>
+          </a:p>
+          <a:p>
+            <a:pPr lvl="1"/>
+            <a:r>
+              <a:rPr lang="en-US" dirty="0" smtClean="0"/>
+              <a:t>[</a:t>
+            </a:r>
+            <a:r>
+              <a:rPr lang="en-US" dirty="0" err="1" smtClean="0"/>
+              <a:t>Colliot</a:t>
+            </a:r>
+            <a:r>
+              <a:rPr lang="en-US" dirty="0" smtClean="0"/>
+              <a:t>] “Integration </a:t>
+            </a:r>
+            <a:r>
+              <a:rPr lang="en-US" dirty="0"/>
+              <a:t>of fuzzy spatial relations in deformable models—Application to brain MRI </a:t>
+            </a:r>
+            <a:r>
+              <a:rPr lang="en-US" dirty="0" smtClean="0"/>
+              <a:t>segmentation” </a:t>
+            </a:r>
+            <a:r>
+              <a:rPr lang="en-US" dirty="0" err="1" smtClean="0"/>
+              <a:t>Colliot</a:t>
+            </a:r>
+            <a:r>
+              <a:rPr lang="en-US" dirty="0" smtClean="0"/>
+              <a:t> &amp; </a:t>
+            </a:r>
+            <a:r>
+              <a:rPr lang="en-US" dirty="0" err="1" smtClean="0"/>
+              <a:t>Camara</a:t>
+            </a:r>
+            <a:r>
+              <a:rPr lang="en-US" dirty="0"/>
+              <a:t>, Isabelle Bloch, </a:t>
+            </a:r>
+            <a:r>
+              <a:rPr lang="en-US" dirty="0" smtClean="0"/>
+              <a:t>2006</a:t>
+            </a:r>
+            <a:endParaRPr lang="en-US" dirty="0"/>
+          </a:p>
+          <a:p>
+            <a:pPr lvl="1"/>
+            <a:endParaRPr lang="en-US" dirty="0" smtClean="0"/>
+          </a:p>
+          <a:p>
+            <a:pPr lvl="1"/>
+            <a:endParaRPr lang="en-US" sz="2400" dirty="0"/>
+          </a:p>
+          <a:p>
+            <a:pPr lvl="1"/>
+            <a:endParaRPr lang="fr-FR" sz="2200" dirty="0" smtClean="0"/>
+          </a:p>
+        </p:txBody>
+      </p:sp>
+      <p:sp>
+        <p:nvSpPr>
+          <p:cNvPr id="5" name="Espace réservé du numéro de diapositive 4"/>
+          <p:cNvSpPr>
+            <a:spLocks noGrp="1"/>
+          </p:cNvSpPr>
+          <p:nvPr>
+            <p:ph type="sldNum" sz="quarter" idx="12"/>
+          </p:nvPr>
+        </p:nvSpPr>
+        <p:spPr/>
+        <p:txBody>
+          <a:bodyPr/>
+          <a:lstStyle/>
+          <a:p>
+            <a:fld id="{D57F1E4F-1CFF-5643-939E-217C01CDF565}" type="slidenum">
+              <a:rPr lang="en-US" smtClean="0"/>
+              <a:pPr/>
+              <a:t>20</a:t>
+            </a:fld>
+            <a:endParaRPr lang="en-US" dirty="0"/>
+          </a:p>
+        </p:txBody>
+      </p:sp>
+    </p:spTree>
+    <p:extLst>
+      <p:ext uri="{BB962C8B-B14F-4D97-AF65-F5344CB8AC3E}">
+        <p14:creationId xmlns:p14="http://schemas.microsoft.com/office/powerpoint/2010/main" val="1610450143"/>
       </p:ext>
     </p:extLst>
   </p:cSld>
@@ -13654,11 +14466,7 @@
             <a:pPr algn="l"/>
             <a:r>
               <a:rPr lang="fr-FR" dirty="0" smtClean="0"/>
-              <a:t>I</a:t>
-            </a:r>
-            <a:r>
-              <a:rPr lang="fr-FR" dirty="0" smtClean="0"/>
-              <a:t>. Rappels sur le RàPC</a:t>
+              <a:t>I. Rappels sur le RàPC</a:t>
             </a:r>
             <a:endParaRPr lang="fr-FR" dirty="0"/>
           </a:p>
@@ -13793,11 +14601,7 @@
             <a:pPr algn="l"/>
             <a:r>
               <a:rPr lang="fr-FR" dirty="0" smtClean="0"/>
-              <a:t>I. </a:t>
-            </a:r>
-            <a:r>
-              <a:rPr lang="fr-FR" dirty="0" smtClean="0"/>
-              <a:t>Rappels sur le RàPC</a:t>
+              <a:t>I. Rappels sur le RàPC</a:t>
             </a:r>
             <a:endParaRPr lang="fr-FR" dirty="0"/>
           </a:p>
@@ -14615,15 +15419,7 @@
             </a:pPr>
             <a:r>
               <a:rPr lang="fr-FR" b="1" dirty="0" smtClean="0"/>
-              <a:t>Premier </a:t>
-            </a:r>
-            <a:r>
-              <a:rPr lang="fr-FR" b="1" dirty="0" smtClean="0"/>
-              <a:t>RàPC sur les </a:t>
-            </a:r>
-            <a:r>
-              <a:rPr lang="fr-FR" b="1" dirty="0" smtClean="0"/>
-              <a:t>caractéristiques statistiques des cas pour déterminer les paramètres de la croissance de région (seuils et prétraitements)</a:t>
+              <a:t>Premier RàPC sur les caractéristiques statistiques des cas pour déterminer les paramètres de la croissance de région (seuils et prétraitements)</a:t>
             </a:r>
           </a:p>
           <a:p>
@@ -14734,11 +15530,7 @@
             </a:pPr>
             <a:r>
               <a:rPr lang="fr-FR" b="1" dirty="0" smtClean="0"/>
-              <a:t>Deuxième RàPC </a:t>
-            </a:r>
-            <a:r>
-              <a:rPr lang="fr-FR" b="1" dirty="0" smtClean="0"/>
-              <a:t>pour déterminer le positionnement des organes (germes)</a:t>
+              <a:t>Deuxième RàPC pour déterminer le positionnement des organes (germes)</a:t>
             </a:r>
             <a:endParaRPr lang="fr-FR" sz="2200" b="1" dirty="0" smtClean="0">
               <a:solidFill>
@@ -14776,7 +15568,6 @@
               <a:rPr lang="fr-FR" sz="2200" dirty="0" smtClean="0"/>
               <a:t>Le positionnement de la tumeur par rapport aux organes</a:t>
             </a:r>
-            <a:endParaRPr lang="fr-FR" sz="2200" dirty="0" smtClean="0"/>
           </a:p>
         </p:txBody>
       </p:sp>
@@ -14876,11 +15667,7 @@
             </a:pPr>
             <a:r>
               <a:rPr lang="fr-FR" b="1" dirty="0" smtClean="0"/>
-              <a:t>Premier </a:t>
-            </a:r>
-            <a:r>
-              <a:rPr lang="fr-FR" b="1" dirty="0" smtClean="0"/>
-              <a:t>RàPC sur </a:t>
+              <a:t>Premier RàPC sur </a:t>
             </a:r>
             <a:r>
               <a:rPr lang="fr-FR" b="1" dirty="0"/>
@@ -15048,8 +15835,8 @@
           </a:p>
         </p:txBody>
       </p:sp>
-      <mc:AlternateContent xmlns:mc="http://schemas.openxmlformats.org/markup-compatibility/2006">
-        <mc:Choice xmlns:a14="http://schemas.microsoft.com/office/drawing/2010/main" Requires="a14">
+      <mc:AlternateContent xmlns:mc="http://schemas.openxmlformats.org/markup-compatibility/2006" xmlns:a14="http://schemas.microsoft.com/office/drawing/2010/main">
+        <mc:Choice Requires="a14">
           <p:sp>
             <p:nvSpPr>
               <p:cNvPr id="3" name="Espace réservé du contenu 2"/>
@@ -15916,7 +16703,7 @@
             </p:txBody>
           </p:sp>
         </mc:Choice>
-        <mc:Fallback>
+        <mc:Fallback xmlns="">
           <p:sp>
             <p:nvSpPr>
               <p:cNvPr id="3" name="Espace réservé du contenu 2"/>
@@ -16220,11 +17007,6 @@
               </a:rPr>
               <a:t>)</a:t>
             </a:r>
-            <a:endParaRPr lang="fr-FR" sz="1400" dirty="0">
-              <a:solidFill>
-                <a:prstClr val="white"/>
-              </a:solidFill>
-            </a:endParaRPr>
           </a:p>
         </p:txBody>
       </p:sp>
@@ -16305,11 +17087,6 @@
               </a:rPr>
               <a:t>)</a:t>
             </a:r>
-            <a:endParaRPr lang="fr-FR" sz="1400" dirty="0">
-              <a:solidFill>
-                <a:prstClr val="white"/>
-              </a:solidFill>
-            </a:endParaRPr>
           </a:p>
         </p:txBody>
       </p:sp>

</xml_diff>